<commit_message>
Updated Presentation for W9-S3
</commit_message>
<xml_diff>
--- a/week-9/W9-S3-Rendering-API-Deployment/W9-S3-Rendering-API-Deployment.pptx
+++ b/week-9/W9-S3-Rendering-API-Deployment/W9-S3-Rendering-API-Deployment.pptx
@@ -5,25 +5,22 @@
     <p:sldMasterId id="2147483968" r:id="rId1"/>
   </p:sldMasterIdLst>
   <p:notesMasterIdLst>
-    <p:notesMasterId r:id="rId15"/>
+    <p:notesMasterId r:id="rId12"/>
   </p:notesMasterIdLst>
   <p:handoutMasterIdLst>
-    <p:handoutMasterId r:id="rId16"/>
+    <p:handoutMasterId r:id="rId13"/>
   </p:handoutMasterIdLst>
   <p:sldIdLst>
     <p:sldId id="256" r:id="rId2"/>
     <p:sldId id="258" r:id="rId3"/>
     <p:sldId id="259" r:id="rId4"/>
     <p:sldId id="294" r:id="rId5"/>
-    <p:sldId id="295" r:id="rId6"/>
-    <p:sldId id="296" r:id="rId7"/>
-    <p:sldId id="287" r:id="rId8"/>
-    <p:sldId id="269" r:id="rId9"/>
-    <p:sldId id="288" r:id="rId10"/>
-    <p:sldId id="289" r:id="rId11"/>
-    <p:sldId id="290" r:id="rId12"/>
-    <p:sldId id="292" r:id="rId13"/>
-    <p:sldId id="264" r:id="rId14"/>
+    <p:sldId id="297" r:id="rId6"/>
+    <p:sldId id="295" r:id="rId7"/>
+    <p:sldId id="296" r:id="rId8"/>
+    <p:sldId id="287" r:id="rId9"/>
+    <p:sldId id="292" r:id="rId10"/>
+    <p:sldId id="264" r:id="rId11"/>
   </p:sldIdLst>
   <p:sldSz cx="12192000" cy="6858000"/>
   <p:notesSz cx="6858000" cy="9144000"/>
@@ -131,13 +128,10 @@
             <p14:sldId id="258"/>
             <p14:sldId id="259"/>
             <p14:sldId id="294"/>
+            <p14:sldId id="297"/>
             <p14:sldId id="295"/>
             <p14:sldId id="296"/>
             <p14:sldId id="287"/>
-            <p14:sldId id="269"/>
-            <p14:sldId id="288"/>
-            <p14:sldId id="289"/>
-            <p14:sldId id="290"/>
             <p14:sldId id="292"/>
             <p14:sldId id="264"/>
           </p14:sldIdLst>
@@ -451,7 +445,7 @@
           <a:p>
             <a:fld id="{AA884A5F-B9F5-9B43-BE5B-EBBCD5646595}" type="datetimeFigureOut">
               <a:rPr lang="en-US" smtClean="0"/>
-              <a:t>10/8/24</a:t>
+              <a:t>11/10/24</a:t>
             </a:fld>
             <a:endParaRPr lang="en-US"/>
           </a:p>
@@ -919,6 +913,114 @@
         <p:cNvPr id="1" name="">
           <a:extLst>
             <a:ext uri="{FF2B5EF4-FFF2-40B4-BE49-F238E27FC236}">
+              <a16:creationId xmlns:a16="http://schemas.microsoft.com/office/drawing/2014/main" id="{B712CDFB-AF04-27BF-AEDD-2305865A1D3C}"/>
+            </a:ext>
+          </a:extLst>
+        </p:cNvPr>
+        <p:cNvGrpSpPr/>
+        <p:nvPr/>
+      </p:nvGrpSpPr>
+      <p:grpSpPr>
+        <a:xfrm>
+          <a:off x="0" y="0"/>
+          <a:ext cx="0" cy="0"/>
+          <a:chOff x="0" y="0"/>
+          <a:chExt cx="0" cy="0"/>
+        </a:xfrm>
+      </p:grpSpPr>
+      <p:sp>
+        <p:nvSpPr>
+          <p:cNvPr id="2" name="Slide Image Placeholder 1">
+            <a:extLst>
+              <a:ext uri="{FF2B5EF4-FFF2-40B4-BE49-F238E27FC236}">
+                <a16:creationId xmlns:a16="http://schemas.microsoft.com/office/drawing/2014/main" id="{9A028D3E-48CB-3368-AA15-8DF6585047FC}"/>
+              </a:ext>
+            </a:extLst>
+          </p:cNvPr>
+          <p:cNvSpPr>
+            <a:spLocks noGrp="1" noRot="1" noChangeAspect="1"/>
+          </p:cNvSpPr>
+          <p:nvPr>
+            <p:ph type="sldImg"/>
+          </p:nvPr>
+        </p:nvSpPr>
+        <p:spPr/>
+      </p:sp>
+      <p:sp>
+        <p:nvSpPr>
+          <p:cNvPr id="3" name="Notes Placeholder 2">
+            <a:extLst>
+              <a:ext uri="{FF2B5EF4-FFF2-40B4-BE49-F238E27FC236}">
+                <a16:creationId xmlns:a16="http://schemas.microsoft.com/office/drawing/2014/main" id="{BE2BA5A6-A230-2421-4CEA-CF64DFE9A2F3}"/>
+              </a:ext>
+            </a:extLst>
+          </p:cNvPr>
+          <p:cNvSpPr>
+            <a:spLocks noGrp="1"/>
+          </p:cNvSpPr>
+          <p:nvPr>
+            <p:ph type="body" idx="1"/>
+          </p:nvPr>
+        </p:nvSpPr>
+        <p:spPr/>
+        <p:txBody>
+          <a:bodyPr/>
+          <a:lstStyle/>
+          <a:p>
+            <a:endParaRPr lang="en-US"/>
+          </a:p>
+        </p:txBody>
+      </p:sp>
+      <p:sp>
+        <p:nvSpPr>
+          <p:cNvPr id="4" name="Slide Number Placeholder 3">
+            <a:extLst>
+              <a:ext uri="{FF2B5EF4-FFF2-40B4-BE49-F238E27FC236}">
+                <a16:creationId xmlns:a16="http://schemas.microsoft.com/office/drawing/2014/main" id="{F7FB6DEA-12C6-D2B3-17EC-3AF58C607DFB}"/>
+              </a:ext>
+            </a:extLst>
+          </p:cNvPr>
+          <p:cNvSpPr>
+            <a:spLocks noGrp="1"/>
+          </p:cNvSpPr>
+          <p:nvPr>
+            <p:ph type="sldNum" sz="quarter" idx="5"/>
+          </p:nvPr>
+        </p:nvSpPr>
+        <p:spPr/>
+        <p:txBody>
+          <a:bodyPr/>
+          <a:lstStyle/>
+          <a:p>
+            <a:fld id="{F091FFD5-F11F-1A49-B4BA-FB7EDA4EBC19}" type="slidenum">
+              <a:rPr lang="en-US" smtClean="0"/>
+              <a:t>5</a:t>
+            </a:fld>
+            <a:endParaRPr lang="en-US"/>
+          </a:p>
+        </p:txBody>
+      </p:sp>
+    </p:spTree>
+    <p:extLst>
+      <p:ext uri="{BB962C8B-B14F-4D97-AF65-F5344CB8AC3E}">
+        <p14:creationId xmlns:p14="http://schemas.microsoft.com/office/powerpoint/2010/main" val="3653977920"/>
+      </p:ext>
+    </p:extLst>
+  </p:cSld>
+  <p:clrMapOvr>
+    <a:masterClrMapping/>
+  </p:clrMapOvr>
+</p:notes>
+</file>
+
+<file path=ppt/notesSlides/notesSlide4.xml><?xml version="1.0" encoding="utf-8"?>
+<p:notes xmlns:a="http://schemas.openxmlformats.org/drawingml/2006/main" xmlns:r="http://schemas.openxmlformats.org/officeDocument/2006/relationships" xmlns:p="http://schemas.openxmlformats.org/presentationml/2006/main">
+  <p:cSld>
+    <p:spTree>
+      <p:nvGrpSpPr>
+        <p:cNvPr id="1" name="">
+          <a:extLst>
+            <a:ext uri="{FF2B5EF4-FFF2-40B4-BE49-F238E27FC236}">
               <a16:creationId xmlns:a16="http://schemas.microsoft.com/office/drawing/2014/main" id="{EAC69E4C-B3A9-C7EC-9AFF-67D24E1246DC}"/>
             </a:ext>
           </a:extLst>
@@ -1000,7 +1102,7 @@
           <a:p>
             <a:fld id="{F091FFD5-F11F-1A49-B4BA-FB7EDA4EBC19}" type="slidenum">
               <a:rPr lang="en-US" smtClean="0"/>
-              <a:t>5</a:t>
+              <a:t>6</a:t>
             </a:fld>
             <a:endParaRPr lang="en-US"/>
           </a:p>
@@ -1019,7 +1121,7 @@
 </p:notes>
 </file>
 
-<file path=ppt/notesSlides/notesSlide4.xml><?xml version="1.0" encoding="utf-8"?>
+<file path=ppt/notesSlides/notesSlide5.xml><?xml version="1.0" encoding="utf-8"?>
 <p:notes xmlns:a="http://schemas.openxmlformats.org/drawingml/2006/main" xmlns:r="http://schemas.openxmlformats.org/officeDocument/2006/relationships" xmlns:p="http://schemas.openxmlformats.org/presentationml/2006/main">
   <p:cSld>
     <p:spTree>
@@ -1108,7 +1210,7 @@
           <a:p>
             <a:fld id="{F091FFD5-F11F-1A49-B4BA-FB7EDA4EBC19}" type="slidenum">
               <a:rPr lang="en-US" smtClean="0"/>
-              <a:t>6</a:t>
+              <a:t>7</a:t>
             </a:fld>
             <a:endParaRPr lang="en-US"/>
           </a:p>
@@ -1372,7 +1474,7 @@
           <a:p>
             <a:fld id="{F6FA2B21-3FCD-4721-B95C-427943F61125}" type="datetime1">
               <a:rPr lang="en-US" smtClean="0"/>
-              <a:t>10/8/24</a:t>
+              <a:t>11/10/24</a:t>
             </a:fld>
             <a:endParaRPr lang="en-US"/>
           </a:p>
@@ -1635,7 +1737,7 @@
           <a:p>
             <a:fld id="{F6FA2B21-3FCD-4721-B95C-427943F61125}" type="datetime1">
               <a:rPr lang="en-US" smtClean="0"/>
-              <a:t>10/8/24</a:t>
+              <a:t>11/10/24</a:t>
             </a:fld>
             <a:endParaRPr lang="en-US"/>
           </a:p>
@@ -1871,7 +1973,7 @@
           <a:p>
             <a:fld id="{F6FA2B21-3FCD-4721-B95C-427943F61125}" type="datetime1">
               <a:rPr lang="en-US" smtClean="0"/>
-              <a:t>10/8/24</a:t>
+              <a:t>11/10/24</a:t>
             </a:fld>
             <a:endParaRPr lang="en-US"/>
           </a:p>
@@ -2199,7 +2301,7 @@
           <a:p>
             <a:fld id="{EA0C0817-A112-4847-8014-A94B7D2A4EA3}" type="datetime1">
               <a:rPr lang="en-US" smtClean="0"/>
-              <a:t>10/8/24</a:t>
+              <a:t>11/10/24</a:t>
             </a:fld>
             <a:endParaRPr lang="en-US" dirty="0"/>
           </a:p>
@@ -2513,7 +2615,7 @@
           <a:p>
             <a:fld id="{7332B432-ACDA-4023-A761-2BAB76577B62}" type="datetime1">
               <a:rPr lang="en-US" smtClean="0"/>
-              <a:t>10/8/24</a:t>
+              <a:t>11/10/24</a:t>
             </a:fld>
             <a:endParaRPr lang="en-US"/>
           </a:p>
@@ -2820,7 +2922,7 @@
           <a:p>
             <a:fld id="{D9C646AA-F36E-4540-911D-FFFC0A0EF24A}" type="datetime1">
               <a:rPr lang="en-US" smtClean="0"/>
-              <a:t>10/8/24</a:t>
+              <a:t>11/10/24</a:t>
             </a:fld>
             <a:endParaRPr lang="en-US" dirty="0"/>
           </a:p>
@@ -3122,7 +3224,7 @@
           <a:p>
             <a:fld id="{69186D26-FA5F-4637-B602-B7C2DC34CFD4}" type="datetime1">
               <a:rPr lang="en-US" smtClean="0"/>
-              <a:t>10/8/24</a:t>
+              <a:t>11/10/24</a:t>
             </a:fld>
             <a:endParaRPr lang="en-US"/>
           </a:p>
@@ -3544,7 +3646,7 @@
           <a:p>
             <a:fld id="{8A7F15D8-96D1-4781-BC50-CA8A088B2FE4}" type="datetime1">
               <a:rPr lang="en-US" smtClean="0"/>
-              <a:t>10/8/24</a:t>
+              <a:t>11/10/24</a:t>
             </a:fld>
             <a:endParaRPr lang="en-US"/>
           </a:p>
@@ -3706,7 +3808,7 @@
           <a:p>
             <a:fld id="{F9A96C99-B8F8-4528-BD05-0E16E943DC09}" type="datetime1">
               <a:rPr lang="en-US" smtClean="0"/>
-              <a:t>10/8/24</a:t>
+              <a:t>11/10/24</a:t>
             </a:fld>
             <a:endParaRPr lang="en-US"/>
           </a:p>
@@ -3801,7 +3903,7 @@
           <a:p>
             <a:fld id="{03636942-C211-4B28-8DBD-C953E00AF71B}" type="datetime1">
               <a:rPr lang="en-US" smtClean="0"/>
-              <a:t>10/8/24</a:t>
+              <a:t>11/10/24</a:t>
             </a:fld>
             <a:endParaRPr lang="en-US"/>
           </a:p>
@@ -4179,7 +4281,7 @@
           <a:p>
             <a:fld id="{7E8D12A6-918A-48BD-8CB9-CA713993B0EA}" type="datetime1">
               <a:rPr lang="en-US" smtClean="0"/>
-              <a:t>10/8/24</a:t>
+              <a:t>11/10/24</a:t>
             </a:fld>
             <a:endParaRPr lang="en-US"/>
           </a:p>
@@ -4468,7 +4570,7 @@
           <a:p>
             <a:fld id="{F6FA2B21-3FCD-4721-B95C-427943F61125}" type="datetime1">
               <a:rPr lang="en-US" smtClean="0"/>
-              <a:t>10/8/24</a:t>
+              <a:t>11/10/24</a:t>
             </a:fld>
             <a:endParaRPr lang="en-US"/>
           </a:p>
@@ -4680,7 +4782,7 @@
           <a:p>
             <a:fld id="{F6FA2B21-3FCD-4721-B95C-427943F61125}" type="datetime1">
               <a:rPr lang="en-US" smtClean="0"/>
-              <a:t>10/8/24</a:t>
+              <a:t>11/10/24</a:t>
             </a:fld>
             <a:endParaRPr lang="en-US"/>
           </a:p>
@@ -5384,7 +5486,7 @@
                   <a:schemeClr val="tx1"/>
                 </a:solidFill>
               </a:rPr>
-              <a:t>HTTP and 3rd Party APIs</a:t>
+              <a:t>Rendering and Deployment with React</a:t>
             </a:r>
             <a:endParaRPr lang="en-US" sz="4000" dirty="0">
               <a:solidFill>
@@ -5448,479 +5550,6 @@
 </file>
 
 <file path=ppt/slides/slide10.xml><?xml version="1.0" encoding="utf-8"?>
-<p:sld xmlns:a="http://schemas.openxmlformats.org/drawingml/2006/main" xmlns:r="http://schemas.openxmlformats.org/officeDocument/2006/relationships" xmlns:p="http://schemas.openxmlformats.org/presentationml/2006/main">
-  <p:cSld>
-    <p:spTree>
-      <p:nvGrpSpPr>
-        <p:cNvPr id="1" name="">
-          <a:extLst>
-            <a:ext uri="{FF2B5EF4-FFF2-40B4-BE49-F238E27FC236}">
-              <a16:creationId xmlns:a16="http://schemas.microsoft.com/office/drawing/2014/main" id="{B4BBCFAD-AB74-790B-C28F-CC6646FE3744}"/>
-            </a:ext>
-          </a:extLst>
-        </p:cNvPr>
-        <p:cNvGrpSpPr/>
-        <p:nvPr/>
-      </p:nvGrpSpPr>
-      <p:grpSpPr>
-        <a:xfrm>
-          <a:off x="0" y="0"/>
-          <a:ext cx="0" cy="0"/>
-          <a:chOff x="0" y="0"/>
-          <a:chExt cx="0" cy="0"/>
-        </a:xfrm>
-      </p:grpSpPr>
-      <p:sp>
-        <p:nvSpPr>
-          <p:cNvPr id="2" name="Title 1">
-            <a:extLst>
-              <a:ext uri="{FF2B5EF4-FFF2-40B4-BE49-F238E27FC236}">
-                <a16:creationId xmlns:a16="http://schemas.microsoft.com/office/drawing/2014/main" id="{0F51729B-E9F3-ED10-8134-49B2A015B911}"/>
-              </a:ext>
-            </a:extLst>
-          </p:cNvPr>
-          <p:cNvSpPr>
-            <a:spLocks noGrp="1"/>
-          </p:cNvSpPr>
-          <p:nvPr>
-            <p:ph type="title"/>
-          </p:nvPr>
-        </p:nvSpPr>
-        <p:spPr>
-          <a:xfrm>
-            <a:off x="581193" y="729658"/>
-            <a:ext cx="11029616" cy="988332"/>
-          </a:xfrm>
-        </p:spPr>
-        <p:txBody>
-          <a:bodyPr anchor="b">
-            <a:normAutofit/>
-          </a:bodyPr>
-          <a:lstStyle/>
-          <a:p>
-            <a:r>
-              <a:rPr lang="en-GB" dirty="0"/>
-              <a:t>Using JSON Data in JavaScript</a:t>
-            </a:r>
-          </a:p>
-        </p:txBody>
-      </p:sp>
-      <p:sp>
-        <p:nvSpPr>
-          <p:cNvPr id="3" name="Content Placeholder 2">
-            <a:extLst>
-              <a:ext uri="{FF2B5EF4-FFF2-40B4-BE49-F238E27FC236}">
-                <a16:creationId xmlns:a16="http://schemas.microsoft.com/office/drawing/2014/main" id="{582D4F13-686A-C501-DCC7-9DE01A2F4267}"/>
-              </a:ext>
-            </a:extLst>
-          </p:cNvPr>
-          <p:cNvSpPr>
-            <a:spLocks noGrp="1"/>
-          </p:cNvSpPr>
-          <p:nvPr>
-            <p:ph sz="half" idx="1"/>
-          </p:nvPr>
-        </p:nvSpPr>
-        <p:spPr>
-          <a:xfrm>
-            <a:off x="581193" y="2228003"/>
-            <a:ext cx="5422390" cy="3633047"/>
-          </a:xfrm>
-        </p:spPr>
-        <p:txBody>
-          <a:bodyPr anchor="ctr">
-            <a:normAutofit/>
-          </a:bodyPr>
-          <a:lstStyle/>
-          <a:p>
-            <a:pPr>
-              <a:buFont typeface="Arial" panose="020B0604020202020204" pitchFamily="34" charset="0"/>
-              <a:buChar char="•"/>
-            </a:pPr>
-            <a:r>
-              <a:rPr lang="en-GB" b="1" dirty="0"/>
-              <a:t>Parsing JSON</a:t>
-            </a:r>
-            <a:r>
-              <a:rPr lang="en-GB" dirty="0"/>
-              <a:t>:</a:t>
-            </a:r>
-            <a:br>
-              <a:rPr lang="en-GB" dirty="0"/>
-            </a:br>
-            <a:br>
-              <a:rPr lang="en-GB" dirty="0"/>
-            </a:br>
-            <a:r>
-              <a:rPr lang="en-GB" dirty="0"/>
-              <a:t>After fetching the data, you can access it in your JavaScript code.</a:t>
-            </a:r>
-          </a:p>
-          <a:p>
-            <a:pPr>
-              <a:buFont typeface="Arial" panose="020B0604020202020204" pitchFamily="34" charset="0"/>
-              <a:buChar char="•"/>
-            </a:pPr>
-            <a:r>
-              <a:rPr lang="en-GB" dirty="0"/>
-              <a:t>Example of accessing fields in JSON</a:t>
-            </a:r>
-          </a:p>
-        </p:txBody>
-      </p:sp>
-      <p:pic>
-        <p:nvPicPr>
-          <p:cNvPr id="5" name="Picture 4" descr="A black background with white text&#10;&#10;Description automatically generated">
-            <a:extLst>
-              <a:ext uri="{FF2B5EF4-FFF2-40B4-BE49-F238E27FC236}">
-                <a16:creationId xmlns:a16="http://schemas.microsoft.com/office/drawing/2014/main" id="{8B856F2D-38CB-BE08-E4E4-D10FCB5091F3}"/>
-              </a:ext>
-            </a:extLst>
-          </p:cNvPr>
-          <p:cNvPicPr>
-            <a:picLocks noChangeAspect="1"/>
-          </p:cNvPicPr>
-          <p:nvPr/>
-        </p:nvPicPr>
-        <p:blipFill>
-          <a:blip r:embed="rId2"/>
-          <a:stretch>
-            <a:fillRect/>
-          </a:stretch>
-        </p:blipFill>
-        <p:spPr>
-          <a:xfrm>
-            <a:off x="6096000" y="3841454"/>
-            <a:ext cx="4800600" cy="876300"/>
-          </a:xfrm>
-          <a:prstGeom prst="rect">
-            <a:avLst/>
-          </a:prstGeom>
-        </p:spPr>
-      </p:pic>
-    </p:spTree>
-    <p:extLst>
-      <p:ext uri="{BB962C8B-B14F-4D97-AF65-F5344CB8AC3E}">
-        <p14:creationId xmlns:p14="http://schemas.microsoft.com/office/powerpoint/2010/main" val="2961728623"/>
-      </p:ext>
-    </p:extLst>
-  </p:cSld>
-  <p:clrMapOvr>
-    <a:masterClrMapping/>
-  </p:clrMapOvr>
-</p:sld>
-</file>
-
-<file path=ppt/slides/slide11.xml><?xml version="1.0" encoding="utf-8"?>
-<p:sld xmlns:a="http://schemas.openxmlformats.org/drawingml/2006/main" xmlns:r="http://schemas.openxmlformats.org/officeDocument/2006/relationships" xmlns:p="http://schemas.openxmlformats.org/presentationml/2006/main">
-  <p:cSld>
-    <p:spTree>
-      <p:nvGrpSpPr>
-        <p:cNvPr id="1" name="">
-          <a:extLst>
-            <a:ext uri="{FF2B5EF4-FFF2-40B4-BE49-F238E27FC236}">
-              <a16:creationId xmlns:a16="http://schemas.microsoft.com/office/drawing/2014/main" id="{F862AD62-4549-3411-613C-C87866C4C489}"/>
-            </a:ext>
-          </a:extLst>
-        </p:cNvPr>
-        <p:cNvGrpSpPr/>
-        <p:nvPr/>
-      </p:nvGrpSpPr>
-      <p:grpSpPr>
-        <a:xfrm>
-          <a:off x="0" y="0"/>
-          <a:ext cx="0" cy="0"/>
-          <a:chOff x="0" y="0"/>
-          <a:chExt cx="0" cy="0"/>
-        </a:xfrm>
-      </p:grpSpPr>
-      <p:sp>
-        <p:nvSpPr>
-          <p:cNvPr id="2" name="Title 1">
-            <a:extLst>
-              <a:ext uri="{FF2B5EF4-FFF2-40B4-BE49-F238E27FC236}">
-                <a16:creationId xmlns:a16="http://schemas.microsoft.com/office/drawing/2014/main" id="{10DFF660-424B-1644-52D3-123663384D33}"/>
-              </a:ext>
-            </a:extLst>
-          </p:cNvPr>
-          <p:cNvSpPr>
-            <a:spLocks noGrp="1"/>
-          </p:cNvSpPr>
-          <p:nvPr>
-            <p:ph type="title"/>
-          </p:nvPr>
-        </p:nvSpPr>
-        <p:spPr>
-          <a:xfrm>
-            <a:off x="581193" y="729658"/>
-            <a:ext cx="11029616" cy="988332"/>
-          </a:xfrm>
-        </p:spPr>
-        <p:txBody>
-          <a:bodyPr anchor="b">
-            <a:normAutofit/>
-          </a:bodyPr>
-          <a:lstStyle/>
-          <a:p>
-            <a:r>
-              <a:rPr lang="en-GB" dirty="0"/>
-              <a:t>Updating DOM Elements with JSON Data</a:t>
-            </a:r>
-          </a:p>
-        </p:txBody>
-      </p:sp>
-      <p:sp>
-        <p:nvSpPr>
-          <p:cNvPr id="3" name="Content Placeholder 2">
-            <a:extLst>
-              <a:ext uri="{FF2B5EF4-FFF2-40B4-BE49-F238E27FC236}">
-                <a16:creationId xmlns:a16="http://schemas.microsoft.com/office/drawing/2014/main" id="{2DB3D8CF-732E-3BB4-5E5A-951912E82DAE}"/>
-              </a:ext>
-            </a:extLst>
-          </p:cNvPr>
-          <p:cNvSpPr>
-            <a:spLocks noGrp="1"/>
-          </p:cNvSpPr>
-          <p:nvPr>
-            <p:ph sz="half" idx="1"/>
-          </p:nvPr>
-        </p:nvSpPr>
-        <p:spPr>
-          <a:xfrm>
-            <a:off x="581193" y="2228003"/>
-            <a:ext cx="5422390" cy="3633047"/>
-          </a:xfrm>
-        </p:spPr>
-        <p:txBody>
-          <a:bodyPr anchor="ctr">
-            <a:normAutofit/>
-          </a:bodyPr>
-          <a:lstStyle/>
-          <a:p>
-            <a:pPr>
-              <a:buFont typeface="Arial" panose="020B0604020202020204" pitchFamily="34" charset="0"/>
-              <a:buChar char="•"/>
-            </a:pPr>
-            <a:r>
-              <a:rPr lang="en-GB" b="1" dirty="0"/>
-              <a:t>DOM Manipulation</a:t>
-            </a:r>
-            <a:r>
-              <a:rPr lang="en-GB" dirty="0"/>
-              <a:t>:</a:t>
-            </a:r>
-            <a:br>
-              <a:rPr lang="en-GB" dirty="0"/>
-            </a:br>
-            <a:br>
-              <a:rPr lang="en-GB" dirty="0"/>
-            </a:br>
-            <a:r>
-              <a:rPr lang="en-GB" dirty="0"/>
-              <a:t>Use JSON data to update elements on the web page dynamically.</a:t>
-            </a:r>
-            <a:br>
-              <a:rPr lang="en-GB" dirty="0"/>
-            </a:br>
-            <a:br>
-              <a:rPr lang="en-GB" dirty="0"/>
-            </a:br>
-            <a:r>
-              <a:rPr lang="en-GB" b="1" dirty="0"/>
-              <a:t>Practical Example</a:t>
-            </a:r>
-            <a:r>
-              <a:rPr lang="en-GB" dirty="0"/>
-              <a:t>:</a:t>
-            </a:r>
-          </a:p>
-          <a:p>
-            <a:pPr marL="742950" lvl="1" indent="-285750">
-              <a:buFont typeface="Arial" panose="020B0604020202020204" pitchFamily="34" charset="0"/>
-              <a:buChar char="•"/>
-            </a:pPr>
-            <a:r>
-              <a:rPr lang="en-GB" dirty="0"/>
-              <a:t>Fetch weather data and update a weather dashboard.</a:t>
-            </a:r>
-          </a:p>
-          <a:p>
-            <a:pPr>
-              <a:buFont typeface="Arial" panose="020B0604020202020204" pitchFamily="34" charset="0"/>
-              <a:buChar char="•"/>
-            </a:pPr>
-            <a:endParaRPr lang="en-GB" dirty="0"/>
-          </a:p>
-        </p:txBody>
-      </p:sp>
-      <p:pic>
-        <p:nvPicPr>
-          <p:cNvPr id="5" name="Picture 4">
-            <a:extLst>
-              <a:ext uri="{FF2B5EF4-FFF2-40B4-BE49-F238E27FC236}">
-                <a16:creationId xmlns:a16="http://schemas.microsoft.com/office/drawing/2014/main" id="{8C93400A-D04C-2DC3-6D6A-AA7D8B3D403F}"/>
-              </a:ext>
-            </a:extLst>
-          </p:cNvPr>
-          <p:cNvPicPr>
-            <a:picLocks noChangeAspect="1"/>
-          </p:cNvPicPr>
-          <p:nvPr/>
-        </p:nvPicPr>
-        <p:blipFill>
-          <a:blip r:embed="rId2"/>
-          <a:stretch>
-            <a:fillRect/>
-          </a:stretch>
-        </p:blipFill>
-        <p:spPr>
-          <a:xfrm>
-            <a:off x="763799" y="5302250"/>
-            <a:ext cx="6375400" cy="558800"/>
-          </a:xfrm>
-          <a:prstGeom prst="rect">
-            <a:avLst/>
-          </a:prstGeom>
-        </p:spPr>
-      </p:pic>
-    </p:spTree>
-    <p:extLst>
-      <p:ext uri="{BB962C8B-B14F-4D97-AF65-F5344CB8AC3E}">
-        <p14:creationId xmlns:p14="http://schemas.microsoft.com/office/powerpoint/2010/main" val="3696916899"/>
-      </p:ext>
-    </p:extLst>
-  </p:cSld>
-  <p:clrMapOvr>
-    <a:masterClrMapping/>
-  </p:clrMapOvr>
-</p:sld>
-</file>
-
-<file path=ppt/slides/slide12.xml><?xml version="1.0" encoding="utf-8"?>
-<p:sld xmlns:a="http://schemas.openxmlformats.org/drawingml/2006/main" xmlns:r="http://schemas.openxmlformats.org/officeDocument/2006/relationships" xmlns:p="http://schemas.openxmlformats.org/presentationml/2006/main">
-  <p:cSld>
-    <p:spTree>
-      <p:nvGrpSpPr>
-        <p:cNvPr id="1" name="">
-          <a:extLst>
-            <a:ext uri="{FF2B5EF4-FFF2-40B4-BE49-F238E27FC236}">
-              <a16:creationId xmlns:a16="http://schemas.microsoft.com/office/drawing/2014/main" id="{CBAE109F-588F-7134-8695-E74285284B6E}"/>
-            </a:ext>
-          </a:extLst>
-        </p:cNvPr>
-        <p:cNvGrpSpPr/>
-        <p:nvPr/>
-      </p:nvGrpSpPr>
-      <p:grpSpPr>
-        <a:xfrm>
-          <a:off x="0" y="0"/>
-          <a:ext cx="0" cy="0"/>
-          <a:chOff x="0" y="0"/>
-          <a:chExt cx="0" cy="0"/>
-        </a:xfrm>
-      </p:grpSpPr>
-      <p:sp>
-        <p:nvSpPr>
-          <p:cNvPr id="2" name="Title 1">
-            <a:extLst>
-              <a:ext uri="{FF2B5EF4-FFF2-40B4-BE49-F238E27FC236}">
-                <a16:creationId xmlns:a16="http://schemas.microsoft.com/office/drawing/2014/main" id="{8AE22E85-AFCF-3262-0A2D-3CAB42E28851}"/>
-              </a:ext>
-            </a:extLst>
-          </p:cNvPr>
-          <p:cNvSpPr>
-            <a:spLocks noGrp="1"/>
-          </p:cNvSpPr>
-          <p:nvPr>
-            <p:ph type="title"/>
-          </p:nvPr>
-        </p:nvSpPr>
-        <p:spPr>
-          <a:xfrm>
-            <a:off x="581193" y="729658"/>
-            <a:ext cx="11029616" cy="988332"/>
-          </a:xfrm>
-        </p:spPr>
-        <p:txBody>
-          <a:bodyPr anchor="b">
-            <a:normAutofit/>
-          </a:bodyPr>
-          <a:lstStyle/>
-          <a:p>
-            <a:r>
-              <a:rPr lang="en-GB" dirty="0"/>
-              <a:t>Conclusion</a:t>
-            </a:r>
-          </a:p>
-        </p:txBody>
-      </p:sp>
-      <p:sp>
-        <p:nvSpPr>
-          <p:cNvPr id="3" name="Content Placeholder 2">
-            <a:extLst>
-              <a:ext uri="{FF2B5EF4-FFF2-40B4-BE49-F238E27FC236}">
-                <a16:creationId xmlns:a16="http://schemas.microsoft.com/office/drawing/2014/main" id="{93A23AC4-3B15-1984-83E6-4892CF66C3FF}"/>
-              </a:ext>
-            </a:extLst>
-          </p:cNvPr>
-          <p:cNvSpPr>
-            <a:spLocks noGrp="1"/>
-          </p:cNvSpPr>
-          <p:nvPr>
-            <p:ph sz="half" idx="1"/>
-          </p:nvPr>
-        </p:nvSpPr>
-        <p:spPr>
-          <a:xfrm>
-            <a:off x="581192" y="2110773"/>
-            <a:ext cx="5198285" cy="3633047"/>
-          </a:xfrm>
-        </p:spPr>
-        <p:txBody>
-          <a:bodyPr anchor="ctr">
-            <a:normAutofit/>
-          </a:bodyPr>
-          <a:lstStyle/>
-          <a:p>
-            <a:r>
-              <a:rPr lang="en-GB" dirty="0"/>
-              <a:t>HTTP is essential for web communication.</a:t>
-            </a:r>
-          </a:p>
-          <a:p>
-            <a:r>
-              <a:rPr lang="en-GB" dirty="0"/>
-              <a:t>You can make HTTP requests using Postman or JavaScript (Fetch).</a:t>
-            </a:r>
-          </a:p>
-          <a:p>
-            <a:r>
-              <a:rPr lang="en-GB" dirty="0"/>
-              <a:t>JSON is the common data format for APIs.</a:t>
-            </a:r>
-          </a:p>
-          <a:p>
-            <a:r>
-              <a:rPr lang="en-GB" dirty="0"/>
-              <a:t>Learn how to update your web page dynamically using data from APIs.</a:t>
-            </a:r>
-          </a:p>
-        </p:txBody>
-      </p:sp>
-    </p:spTree>
-    <p:extLst>
-      <p:ext uri="{BB962C8B-B14F-4D97-AF65-F5344CB8AC3E}">
-        <p14:creationId xmlns:p14="http://schemas.microsoft.com/office/powerpoint/2010/main" val="4093454545"/>
-      </p:ext>
-    </p:extLst>
-  </p:cSld>
-  <p:clrMapOvr>
-    <a:masterClrMapping/>
-  </p:clrMapOvr>
-</p:sld>
-</file>
-
-<file path=ppt/slides/slide13.xml><?xml version="1.0" encoding="utf-8"?>
 <p:sld xmlns:a="http://schemas.openxmlformats.org/drawingml/2006/main" xmlns:r="http://schemas.openxmlformats.org/officeDocument/2006/relationships" xmlns:p="http://schemas.openxmlformats.org/presentationml/2006/main">
   <p:cSld>
     <p:spTree>
@@ -6037,7 +5666,7 @@
           <a:p>
             <a:r>
               <a:rPr lang="en-GB" dirty="0"/>
-              <a:t>HTTP and 3rd Party APIs</a:t>
+              <a:t>APIs, Conditional Rendering, Layouts, and Deployment</a:t>
             </a:r>
           </a:p>
         </p:txBody>
@@ -6092,8 +5721,16 @@
             </a:pPr>
             <a:r>
               <a:rPr lang="en-GB" dirty="0"/>
-              <a:t>The basics of HTTP</a:t>
-            </a:r>
+              <a:t>Using </a:t>
+            </a:r>
+            <a:r>
+              <a:rPr lang="en-GB" dirty="0">
+                <a:effectLst/>
+                <a:latin typeface="Helvetica Neue" panose="02000503000000020004" pitchFamily="2" charset="0"/>
+              </a:rPr>
+              <a:t>3rd party APIs with React</a:t>
+            </a:r>
+            <a:endParaRPr lang="en-GB" dirty="0"/>
           </a:p>
           <a:p>
             <a:pPr>
@@ -6101,9 +5738,13 @@
               <a:buAutoNum type="arabicPeriod"/>
             </a:pPr>
             <a:r>
-              <a:rPr lang="en-GB" dirty="0"/>
-              <a:t>How to make HTTP requests</a:t>
-            </a:r>
+              <a:rPr lang="en-GB" dirty="0">
+                <a:effectLst/>
+                <a:latin typeface="Helvetica Neue" panose="02000503000000020004" pitchFamily="2" charset="0"/>
+              </a:rPr>
+              <a:t>Conditional Rendering</a:t>
+            </a:r>
+            <a:endParaRPr lang="en-GB" dirty="0"/>
           </a:p>
           <a:p>
             <a:pPr>
@@ -6111,9 +5752,13 @@
               <a:buAutoNum type="arabicPeriod"/>
             </a:pPr>
             <a:r>
-              <a:rPr lang="en-GB" dirty="0"/>
-              <a:t>Using APIs with tools like Postman</a:t>
-            </a:r>
+              <a:rPr lang="en-GB" dirty="0">
+                <a:effectLst/>
+                <a:latin typeface="Helvetica Neue" panose="02000503000000020004" pitchFamily="2" charset="0"/>
+              </a:rPr>
+              <a:t>App Layouts</a:t>
+            </a:r>
+            <a:endParaRPr lang="en-GB" dirty="0"/>
           </a:p>
           <a:p>
             <a:pPr>
@@ -6121,9 +5766,23 @@
               <a:buAutoNum type="arabicPeriod"/>
             </a:pPr>
             <a:r>
-              <a:rPr lang="en-GB" dirty="0"/>
-              <a:t>Fetching and using JSON data in JavaScript</a:t>
-            </a:r>
+              <a:rPr lang="en-GB" dirty="0">
+                <a:effectLst/>
+                <a:latin typeface="Helvetica Neue" panose="02000503000000020004" pitchFamily="2" charset="0"/>
+              </a:rPr>
+              <a:t>Deployment with </a:t>
+            </a:r>
+            <a:r>
+              <a:rPr lang="en-GB" dirty="0" err="1">
+                <a:effectLst/>
+                <a:latin typeface="Helvetica Neue" panose="02000503000000020004" pitchFamily="2" charset="0"/>
+              </a:rPr>
+              <a:t>render.com</a:t>
+            </a:r>
+            <a:endParaRPr lang="en-GB" dirty="0">
+              <a:effectLst/>
+              <a:latin typeface="Helvetica Neue" panose="02000503000000020004" pitchFamily="2" charset="0"/>
+            </a:endParaRPr>
           </a:p>
         </p:txBody>
       </p:sp>
@@ -6187,7 +5846,7 @@
           <a:p>
             <a:r>
               <a:rPr lang="en-GB" dirty="0"/>
-              <a:t>The Fundamentals of HTTP</a:t>
+              <a:t>Using 3rd Party APIs in React with fetch</a:t>
             </a:r>
           </a:p>
         </p:txBody>
@@ -6220,79 +5879,76 @@
           </a:bodyPr>
           <a:lstStyle/>
           <a:p>
-            <a:pPr>
-              <a:buFont typeface="Arial" panose="020B0604020202020204" pitchFamily="34" charset="0"/>
-              <a:buChar char="•"/>
-            </a:pPr>
             <a:r>
               <a:rPr lang="en-GB" b="1" dirty="0"/>
-              <a:t>What is HTTP</a:t>
-            </a:r>
+              <a:t>What is fetch?</a:t>
+            </a:r>
+            <a:br>
+              <a:rPr lang="en-GB" b="1" dirty="0"/>
+            </a:br>
             <a:r>
               <a:rPr lang="en-GB" dirty="0"/>
-              <a:t>:</a:t>
-            </a:r>
-          </a:p>
-          <a:p>
-            <a:pPr marL="742950" lvl="1" indent="-285750">
-              <a:buFont typeface="Arial" panose="020B0604020202020204" pitchFamily="34" charset="0"/>
-              <a:buChar char="•"/>
-            </a:pPr>
+              <a:t>A JavaScript function for making HTTP requests to APIs.</a:t>
+            </a:r>
+          </a:p>
+          <a:p>
             <a:r>
               <a:rPr lang="en-GB" dirty="0" err="1"/>
-              <a:t>HyperText</a:t>
+              <a:t>useEffect</a:t>
             </a:r>
             <a:r>
               <a:rPr lang="en-GB" dirty="0"/>
-              <a:t> Transfer Protocol (HTTP) is the foundation of communication on the web.</a:t>
-            </a:r>
-          </a:p>
-          <a:p>
-            <a:pPr marL="742950" lvl="1" indent="-285750">
-              <a:buFont typeface="Arial" panose="020B0604020202020204" pitchFamily="34" charset="0"/>
-              <a:buChar char="•"/>
-            </a:pPr>
+              <a:t> used to fetch data after the component mounts.</a:t>
+            </a:r>
+          </a:p>
+          <a:p>
             <a:r>
               <a:rPr lang="en-GB" dirty="0"/>
-              <a:t>It enables browsers and servers to exchange data.</a:t>
-            </a:r>
-          </a:p>
-          <a:p>
-            <a:pPr>
-              <a:buFont typeface="Arial" panose="020B0604020202020204" pitchFamily="34" charset="0"/>
-              <a:buChar char="•"/>
-            </a:pPr>
-            <a:r>
-              <a:rPr lang="en-GB" b="1" dirty="0"/>
-              <a:t>Key Concepts</a:t>
-            </a:r>
-            <a:r>
+              <a:t>Data is stored in state and displayed in the component.</a:t>
+            </a:r>
+            <a:br>
               <a:rPr lang="en-GB" dirty="0"/>
-              <a:t>:</a:t>
-            </a:r>
-          </a:p>
-          <a:p>
-            <a:pPr marL="742950" lvl="1" indent="-285750">
-              <a:buFont typeface="Arial" panose="020B0604020202020204" pitchFamily="34" charset="0"/>
-              <a:buChar char="•"/>
-            </a:pPr>
-            <a:r>
+            </a:br>
+            <a:br>
               <a:rPr lang="en-GB" dirty="0"/>
-              <a:t>Clients (your browser, Postman) request resources.</a:t>
-            </a:r>
-          </a:p>
-          <a:p>
-            <a:pPr marL="742950" lvl="1" indent="-285750">
-              <a:buFont typeface="Arial" panose="020B0604020202020204" pitchFamily="34" charset="0"/>
-              <a:buChar char="•"/>
-            </a:pPr>
+            </a:br>
             <a:r>
               <a:rPr lang="en-GB" dirty="0"/>
-              <a:t>Servers respond to those requests.</a:t>
-            </a:r>
-          </a:p>
-        </p:txBody>
-      </p:sp>
+              <a:t>Demo…</a:t>
+            </a:r>
+          </a:p>
+        </p:txBody>
+      </p:sp>
+      <p:pic>
+        <p:nvPicPr>
+          <p:cNvPr id="5" name="Picture 4" descr="A computer screen shot of a program code&#10;&#10;Description automatically generated">
+            <a:extLst>
+              <a:ext uri="{FF2B5EF4-FFF2-40B4-BE49-F238E27FC236}">
+                <a16:creationId xmlns:a16="http://schemas.microsoft.com/office/drawing/2014/main" id="{EFDF4EED-9D3C-20CB-9105-6C05FD4B5E7C}"/>
+              </a:ext>
+            </a:extLst>
+          </p:cNvPr>
+          <p:cNvPicPr>
+            <a:picLocks noChangeAspect="1"/>
+          </p:cNvPicPr>
+          <p:nvPr/>
+        </p:nvPicPr>
+        <p:blipFill>
+          <a:blip r:embed="rId3"/>
+          <a:stretch>
+            <a:fillRect/>
+          </a:stretch>
+        </p:blipFill>
+        <p:spPr>
+          <a:xfrm>
+            <a:off x="6003583" y="2388561"/>
+            <a:ext cx="5943112" cy="3472489"/>
+          </a:xfrm>
+          <a:prstGeom prst="rect">
+            <a:avLst/>
+          </a:prstGeom>
+        </p:spPr>
+      </p:pic>
     </p:spTree>
     <p:extLst>
       <p:ext uri="{BB962C8B-B14F-4D97-AF65-F5344CB8AC3E}">
@@ -6359,7 +6015,7 @@
           <a:p>
             <a:r>
               <a:rPr lang="en-GB" dirty="0"/>
-              <a:t>How HTTP Requests Work</a:t>
+              <a:t>Conditional Rendering in React</a:t>
             </a:r>
           </a:p>
         </p:txBody>
@@ -6388,17 +6044,26 @@
         </p:spPr>
         <p:txBody>
           <a:bodyPr anchor="ctr">
-            <a:normAutofit fontScale="85000" lnSpcReduction="20000"/>
+            <a:normAutofit/>
           </a:bodyPr>
           <a:lstStyle/>
           <a:p>
-            <a:pPr>
-              <a:buFont typeface="Arial" panose="020B0604020202020204" pitchFamily="34" charset="0"/>
-              <a:buChar char="•"/>
-            </a:pPr>
             <a:r>
               <a:rPr lang="en-GB" b="1" dirty="0"/>
-              <a:t>The Request-Response Cycle</a:t>
+              <a:t>What is Conditional Rendering?</a:t>
+            </a:r>
+            <a:br>
+              <a:rPr lang="en-GB" b="1" dirty="0"/>
+            </a:br>
+            <a:r>
+              <a:rPr lang="en-GB" dirty="0"/>
+              <a:t>A technique to render elements or components based on certain conditions.</a:t>
+            </a:r>
+          </a:p>
+          <a:p>
+            <a:r>
+              <a:rPr lang="en-GB" b="1" dirty="0"/>
+              <a:t>Common Patterns</a:t>
             </a:r>
             <a:r>
               <a:rPr lang="en-GB" dirty="0"/>
@@ -6410,13 +6075,12 @@
             <a:br>
               <a:rPr lang="en-GB" dirty="0"/>
             </a:br>
-            <a:r>
-              <a:rPr lang="en-GB" b="1" dirty="0"/>
-              <a:t>Request</a:t>
-            </a:r>
-            <a:r>
+            <a:br>
               <a:rPr lang="en-GB" dirty="0"/>
-              <a:t>: Made by the client (browser or API tool) to request data.</a:t>
+            </a:br>
+            <a:r>
+              <a:rPr lang="en-GB" dirty="0"/>
+              <a:t>Ternary Operator:</a:t>
             </a:r>
             <a:br>
               <a:rPr lang="en-GB" dirty="0"/>
@@ -6425,89 +6089,11 @@
               <a:rPr lang="en-GB" dirty="0"/>
             </a:br>
             <a:r>
-              <a:rPr lang="en-GB" b="1" dirty="0"/>
-              <a:t>Response</a:t>
-            </a:r>
-            <a:r>
               <a:rPr lang="en-GB" dirty="0"/>
-              <a:t>: Sent by the server, often in HTML, JSON, or another format.</a:t>
-            </a:r>
-          </a:p>
-          <a:p>
-            <a:pPr>
-              <a:buFont typeface="Arial" panose="020B0604020202020204" pitchFamily="34" charset="0"/>
-              <a:buChar char="•"/>
-            </a:pPr>
-            <a:r>
-              <a:rPr lang="en-GB" b="1" dirty="0"/>
-              <a:t>Components of an HTTP Request</a:t>
-            </a:r>
-            <a:r>
-              <a:rPr lang="en-GB" dirty="0"/>
-              <a:t>:</a:t>
-            </a:r>
-            <a:br>
-              <a:rPr lang="en-GB" dirty="0"/>
-            </a:br>
-            <a:br>
-              <a:rPr lang="en-GB" dirty="0"/>
-            </a:br>
-            <a:r>
-              <a:rPr lang="en-GB" b="1" dirty="0"/>
-              <a:t>URL</a:t>
-            </a:r>
-            <a:r>
-              <a:rPr lang="en-GB" dirty="0"/>
-              <a:t>: The address of the resource.</a:t>
-            </a:r>
-            <a:br>
-              <a:rPr lang="en-GB" dirty="0"/>
-            </a:br>
-            <a:br>
-              <a:rPr lang="en-GB" dirty="0"/>
-            </a:br>
-            <a:r>
-              <a:rPr lang="en-GB" b="1" dirty="0"/>
-              <a:t>Method</a:t>
-            </a:r>
-            <a:r>
-              <a:rPr lang="en-GB" dirty="0"/>
-              <a:t>: GET, POST, etc.</a:t>
-            </a:r>
-            <a:br>
-              <a:rPr lang="en-GB" dirty="0"/>
-            </a:br>
-            <a:br>
-              <a:rPr lang="en-GB" dirty="0"/>
-            </a:br>
-            <a:r>
-              <a:rPr lang="en-GB" b="1" dirty="0"/>
-              <a:t>Headers</a:t>
-            </a:r>
-            <a:r>
-              <a:rPr lang="en-GB" dirty="0"/>
-              <a:t>: Additional information, like content type.</a:t>
-            </a:r>
-            <a:br>
-              <a:rPr lang="en-GB" dirty="0"/>
-            </a:br>
-            <a:br>
-              <a:rPr lang="en-GB" dirty="0"/>
-            </a:br>
-            <a:r>
-              <a:rPr lang="en-GB" b="1" dirty="0"/>
-              <a:t>Body</a:t>
-            </a:r>
-            <a:r>
-              <a:rPr lang="en-GB" dirty="0"/>
-              <a:t>: (Optional) Data sent with requests (mainly POST).</a:t>
-            </a:r>
-            <a:br>
-              <a:rPr lang="en-GB" dirty="0"/>
-            </a:br>
-            <a:br>
-              <a:rPr lang="en-GB" dirty="0"/>
-            </a:br>
+              <a:t>Logical AND (&amp;&amp;):</a:t>
+            </a:r>
+          </a:p>
+          <a:p>
             <a:endParaRPr lang="en-GB" dirty="0"/>
           </a:p>
         </p:txBody>
@@ -6743,40 +6329,70 @@
             <a:pPr marL="0" indent="0">
               <a:buNone/>
             </a:pPr>
-            <a:r>
-              <a:rPr lang="en-GB" sz="1500" dirty="0"/>
-              <a:t>Example:</a:t>
-            </a:r>
-            <a:endParaRPr lang="en-GB" sz="1500" dirty="0">
-              <a:hlinkClick r:id="rId3">
-                <a:extLst>
-                  <a:ext uri="{A12FA001-AC4F-418D-AE19-62706E023703}">
-                    <ahyp:hlinkClr xmlns:ahyp="http://schemas.microsoft.com/office/drawing/2018/hyperlinkcolor" val="tx"/>
-                  </a:ext>
-                </a:extLst>
-              </a:hlinkClick>
-            </a:endParaRPr>
-          </a:p>
-          <a:p>
-            <a:pPr marL="0" indent="0">
-              <a:buNone/>
-            </a:pPr>
-            <a:r>
-              <a:rPr lang="en-GB" sz="1500" dirty="0">
-                <a:hlinkClick r:id="rId3">
-                  <a:extLst>
-                    <a:ext uri="{A12FA001-AC4F-418D-AE19-62706E023703}">
-                      <ahyp:hlinkClr xmlns:ahyp="http://schemas.microsoft.com/office/drawing/2018/hyperlinkcolor" val="tx"/>
-                    </a:ext>
-                  </a:extLst>
-                </a:hlinkClick>
-              </a:rPr>
-              <a:t>https://www.oreilly.com/library/view/restful-java-web/9781788294041/1889f99d-f907-41c3-a0f0-925bbf1d3825.xhtml</a:t>
-            </a:r>
             <a:endParaRPr lang="en-GB" sz="1500" dirty="0"/>
           </a:p>
         </p:txBody>
       </p:sp>
+      <p:pic>
+        <p:nvPicPr>
+          <p:cNvPr id="6" name="Picture 5">
+            <a:extLst>
+              <a:ext uri="{FF2B5EF4-FFF2-40B4-BE49-F238E27FC236}">
+                <a16:creationId xmlns:a16="http://schemas.microsoft.com/office/drawing/2014/main" id="{AB2E7141-4201-E60D-9F8C-9AC23B02DF97}"/>
+              </a:ext>
+            </a:extLst>
+          </p:cNvPr>
+          <p:cNvPicPr>
+            <a:picLocks noChangeAspect="1"/>
+          </p:cNvPicPr>
+          <p:nvPr/>
+        </p:nvPicPr>
+        <p:blipFill>
+          <a:blip r:embed="rId3"/>
+          <a:stretch>
+            <a:fillRect/>
+          </a:stretch>
+        </p:blipFill>
+        <p:spPr>
+          <a:xfrm>
+            <a:off x="6096000" y="2908300"/>
+            <a:ext cx="5054600" cy="520700"/>
+          </a:xfrm>
+          <a:prstGeom prst="rect">
+            <a:avLst/>
+          </a:prstGeom>
+        </p:spPr>
+      </p:pic>
+      <p:pic>
+        <p:nvPicPr>
+          <p:cNvPr id="7" name="Picture 6">
+            <a:extLst>
+              <a:ext uri="{FF2B5EF4-FFF2-40B4-BE49-F238E27FC236}">
+                <a16:creationId xmlns:a16="http://schemas.microsoft.com/office/drawing/2014/main" id="{62623605-8CA3-52F5-EBC8-F3DE78845F21}"/>
+              </a:ext>
+            </a:extLst>
+          </p:cNvPr>
+          <p:cNvPicPr>
+            <a:picLocks noChangeAspect="1"/>
+          </p:cNvPicPr>
+          <p:nvPr/>
+        </p:nvPicPr>
+        <p:blipFill>
+          <a:blip r:embed="rId4"/>
+          <a:stretch>
+            <a:fillRect/>
+          </a:stretch>
+        </p:blipFill>
+        <p:spPr>
+          <a:xfrm>
+            <a:off x="6096000" y="4238515"/>
+            <a:ext cx="3378200" cy="546100"/>
+          </a:xfrm>
+          <a:prstGeom prst="rect">
+            <a:avLst/>
+          </a:prstGeom>
+        </p:spPr>
+      </p:pic>
     </p:spTree>
     <p:extLst>
       <p:ext uri="{BB962C8B-B14F-4D97-AF65-F5344CB8AC3E}">
@@ -6791,6 +6407,387 @@
 </file>
 
 <file path=ppt/slides/slide5.xml><?xml version="1.0" encoding="utf-8"?>
+<p:sld xmlns:a="http://schemas.openxmlformats.org/drawingml/2006/main" xmlns:r="http://schemas.openxmlformats.org/officeDocument/2006/relationships" xmlns:p="http://schemas.openxmlformats.org/presentationml/2006/main">
+  <p:cSld>
+    <p:spTree>
+      <p:nvGrpSpPr>
+        <p:cNvPr id="1" name="">
+          <a:extLst>
+            <a:ext uri="{FF2B5EF4-FFF2-40B4-BE49-F238E27FC236}">
+              <a16:creationId xmlns:a16="http://schemas.microsoft.com/office/drawing/2014/main" id="{3CD1E3F6-D7D1-F598-ECDB-0292B50BA078}"/>
+            </a:ext>
+          </a:extLst>
+        </p:cNvPr>
+        <p:cNvGrpSpPr/>
+        <p:nvPr/>
+      </p:nvGrpSpPr>
+      <p:grpSpPr>
+        <a:xfrm>
+          <a:off x="0" y="0"/>
+          <a:ext cx="0" cy="0"/>
+          <a:chOff x="0" y="0"/>
+          <a:chExt cx="0" cy="0"/>
+        </a:xfrm>
+      </p:grpSpPr>
+      <p:sp>
+        <p:nvSpPr>
+          <p:cNvPr id="2" name="Title 1">
+            <a:extLst>
+              <a:ext uri="{FF2B5EF4-FFF2-40B4-BE49-F238E27FC236}">
+                <a16:creationId xmlns:a16="http://schemas.microsoft.com/office/drawing/2014/main" id="{C3526EE1-BAAB-88E8-269D-5927DD26AD19}"/>
+              </a:ext>
+            </a:extLst>
+          </p:cNvPr>
+          <p:cNvSpPr>
+            <a:spLocks noGrp="1"/>
+          </p:cNvSpPr>
+          <p:nvPr>
+            <p:ph type="title"/>
+          </p:nvPr>
+        </p:nvSpPr>
+        <p:spPr>
+          <a:xfrm>
+            <a:off x="581193" y="729658"/>
+            <a:ext cx="11029616" cy="988332"/>
+          </a:xfrm>
+        </p:spPr>
+        <p:txBody>
+          <a:bodyPr anchor="b">
+            <a:normAutofit/>
+          </a:bodyPr>
+          <a:lstStyle/>
+          <a:p>
+            <a:r>
+              <a:rPr lang="en-GB" dirty="0"/>
+              <a:t>Conditional Rendering in React</a:t>
+            </a:r>
+          </a:p>
+        </p:txBody>
+      </p:sp>
+      <p:sp>
+        <p:nvSpPr>
+          <p:cNvPr id="3" name="Content Placeholder 2">
+            <a:extLst>
+              <a:ext uri="{FF2B5EF4-FFF2-40B4-BE49-F238E27FC236}">
+                <a16:creationId xmlns:a16="http://schemas.microsoft.com/office/drawing/2014/main" id="{D26B0C9D-FF1B-BE47-4F7E-72B1C7F14242}"/>
+              </a:ext>
+            </a:extLst>
+          </p:cNvPr>
+          <p:cNvSpPr>
+            <a:spLocks noGrp="1"/>
+          </p:cNvSpPr>
+          <p:nvPr>
+            <p:ph sz="half" idx="1"/>
+          </p:nvPr>
+        </p:nvSpPr>
+        <p:spPr>
+          <a:xfrm>
+            <a:off x="581193" y="2228003"/>
+            <a:ext cx="5422390" cy="3633047"/>
+          </a:xfrm>
+        </p:spPr>
+        <p:txBody>
+          <a:bodyPr anchor="ctr">
+            <a:normAutofit/>
+          </a:bodyPr>
+          <a:lstStyle/>
+          <a:p>
+            <a:r>
+              <a:rPr lang="en-GB" dirty="0"/>
+              <a:t>Render loading spinner until data is loaded:</a:t>
+            </a:r>
+            <a:br>
+              <a:rPr lang="en-GB" dirty="0"/>
+            </a:br>
+            <a:br>
+              <a:rPr lang="en-GB" dirty="0"/>
+            </a:br>
+            <a:r>
+              <a:rPr lang="en-GB" dirty="0"/>
+              <a:t>demo…</a:t>
+            </a:r>
+          </a:p>
+        </p:txBody>
+      </p:sp>
+      <p:sp>
+        <p:nvSpPr>
+          <p:cNvPr id="4" name="Content Placeholder 2">
+            <a:extLst>
+              <a:ext uri="{FF2B5EF4-FFF2-40B4-BE49-F238E27FC236}">
+                <a16:creationId xmlns:a16="http://schemas.microsoft.com/office/drawing/2014/main" id="{EB2A772F-EA21-46EB-F19C-466521EA43D3}"/>
+              </a:ext>
+            </a:extLst>
+          </p:cNvPr>
+          <p:cNvSpPr txBox="1">
+            <a:spLocks/>
+          </p:cNvSpPr>
+          <p:nvPr/>
+        </p:nvSpPr>
+        <p:spPr>
+          <a:xfrm>
+            <a:off x="6096000" y="2228003"/>
+            <a:ext cx="5422390" cy="3633047"/>
+          </a:xfrm>
+          <a:prstGeom prst="rect">
+            <a:avLst/>
+          </a:prstGeom>
+        </p:spPr>
+        <p:txBody>
+          <a:bodyPr vert="horz" lIns="91440" tIns="45720" rIns="91440" bIns="45720" rtlCol="0" anchor="ctr">
+            <a:normAutofit/>
+          </a:bodyPr>
+          <a:lstStyle>
+            <a:lvl1pPr marL="306000" indent="-306000" algn="l" defTabSz="457200" rtl="0" eaLnBrk="1" latinLnBrk="0" hangingPunct="1">
+              <a:spcBef>
+                <a:spcPct val="20000"/>
+              </a:spcBef>
+              <a:spcAft>
+                <a:spcPts val="600"/>
+              </a:spcAft>
+              <a:buClr>
+                <a:schemeClr val="accent2"/>
+              </a:buClr>
+              <a:buSzPct val="92000"/>
+              <a:buFont typeface="Wingdings 2" panose="05020102010507070707" pitchFamily="18" charset="2"/>
+              <a:buChar char=""/>
+              <a:defRPr sz="1800" kern="1200">
+                <a:solidFill>
+                  <a:schemeClr val="tx2"/>
+                </a:solidFill>
+                <a:latin typeface="+mn-lt"/>
+                <a:ea typeface="+mn-ea"/>
+                <a:cs typeface="+mn-cs"/>
+              </a:defRPr>
+            </a:lvl1pPr>
+            <a:lvl2pPr marL="630000" indent="-306000" algn="l" defTabSz="457200" rtl="0" eaLnBrk="1" latinLnBrk="0" hangingPunct="1">
+              <a:spcBef>
+                <a:spcPct val="20000"/>
+              </a:spcBef>
+              <a:spcAft>
+                <a:spcPts val="600"/>
+              </a:spcAft>
+              <a:buClr>
+                <a:schemeClr val="accent2"/>
+              </a:buClr>
+              <a:buSzPct val="92000"/>
+              <a:buFont typeface="Wingdings 2" panose="05020102010507070707" pitchFamily="18" charset="2"/>
+              <a:buChar char=""/>
+              <a:defRPr sz="1600" kern="1200">
+                <a:solidFill>
+                  <a:schemeClr val="tx2"/>
+                </a:solidFill>
+                <a:latin typeface="+mn-lt"/>
+                <a:ea typeface="+mn-ea"/>
+                <a:cs typeface="+mn-cs"/>
+              </a:defRPr>
+            </a:lvl2pPr>
+            <a:lvl3pPr marL="900000" indent="-270000" algn="l" defTabSz="457200" rtl="0" eaLnBrk="1" latinLnBrk="0" hangingPunct="1">
+              <a:spcBef>
+                <a:spcPct val="20000"/>
+              </a:spcBef>
+              <a:spcAft>
+                <a:spcPts val="600"/>
+              </a:spcAft>
+              <a:buClr>
+                <a:schemeClr val="accent2"/>
+              </a:buClr>
+              <a:buSzPct val="92000"/>
+              <a:buFont typeface="Wingdings 2" panose="05020102010507070707" pitchFamily="18" charset="2"/>
+              <a:buChar char=""/>
+              <a:defRPr sz="1400" kern="1200">
+                <a:solidFill>
+                  <a:schemeClr val="tx2"/>
+                </a:solidFill>
+                <a:latin typeface="+mn-lt"/>
+                <a:ea typeface="+mn-ea"/>
+                <a:cs typeface="+mn-cs"/>
+              </a:defRPr>
+            </a:lvl3pPr>
+            <a:lvl4pPr marL="1242000" indent="-234000" algn="l" defTabSz="457200" rtl="0" eaLnBrk="1" latinLnBrk="0" hangingPunct="1">
+              <a:spcBef>
+                <a:spcPct val="20000"/>
+              </a:spcBef>
+              <a:spcAft>
+                <a:spcPts val="600"/>
+              </a:spcAft>
+              <a:buClr>
+                <a:schemeClr val="accent2"/>
+              </a:buClr>
+              <a:buSzPct val="92000"/>
+              <a:buFont typeface="Wingdings 2" panose="05020102010507070707" pitchFamily="18" charset="2"/>
+              <a:buChar char=""/>
+              <a:defRPr sz="1200" kern="1200">
+                <a:solidFill>
+                  <a:schemeClr val="tx2"/>
+                </a:solidFill>
+                <a:latin typeface="+mn-lt"/>
+                <a:ea typeface="+mn-ea"/>
+                <a:cs typeface="+mn-cs"/>
+              </a:defRPr>
+            </a:lvl4pPr>
+            <a:lvl5pPr marL="1602000" indent="-234000" algn="l" defTabSz="457200" rtl="0" eaLnBrk="1" latinLnBrk="0" hangingPunct="1">
+              <a:spcBef>
+                <a:spcPct val="20000"/>
+              </a:spcBef>
+              <a:spcAft>
+                <a:spcPts val="600"/>
+              </a:spcAft>
+              <a:buClr>
+                <a:schemeClr val="accent2"/>
+              </a:buClr>
+              <a:buSzPct val="92000"/>
+              <a:buFont typeface="Wingdings 2" panose="05020102010507070707" pitchFamily="18" charset="2"/>
+              <a:buChar char=""/>
+              <a:defRPr sz="1200" kern="1200">
+                <a:solidFill>
+                  <a:schemeClr val="tx2"/>
+                </a:solidFill>
+                <a:latin typeface="+mn-lt"/>
+                <a:ea typeface="+mn-ea"/>
+                <a:cs typeface="+mn-cs"/>
+              </a:defRPr>
+            </a:lvl5pPr>
+            <a:lvl6pPr marL="1900000" indent="-228600" algn="l" defTabSz="457200" rtl="0" eaLnBrk="1" latinLnBrk="0" hangingPunct="1">
+              <a:spcBef>
+                <a:spcPct val="20000"/>
+              </a:spcBef>
+              <a:spcAft>
+                <a:spcPts val="600"/>
+              </a:spcAft>
+              <a:buClr>
+                <a:schemeClr val="accent2"/>
+              </a:buClr>
+              <a:buSzPct val="92000"/>
+              <a:buFont typeface="Wingdings 2" panose="05020102010507070707" pitchFamily="18" charset="2"/>
+              <a:buChar char=""/>
+              <a:defRPr sz="1200" kern="1200">
+                <a:solidFill>
+                  <a:schemeClr val="tx2"/>
+                </a:solidFill>
+                <a:latin typeface="+mn-lt"/>
+                <a:ea typeface="+mn-ea"/>
+                <a:cs typeface="+mn-cs"/>
+              </a:defRPr>
+            </a:lvl6pPr>
+            <a:lvl7pPr marL="2200000" indent="-228600" algn="l" defTabSz="457200" rtl="0" eaLnBrk="1" latinLnBrk="0" hangingPunct="1">
+              <a:spcBef>
+                <a:spcPct val="20000"/>
+              </a:spcBef>
+              <a:spcAft>
+                <a:spcPts val="600"/>
+              </a:spcAft>
+              <a:buClr>
+                <a:schemeClr val="accent2"/>
+              </a:buClr>
+              <a:buSzPct val="92000"/>
+              <a:buFont typeface="Wingdings 2" panose="05020102010507070707" pitchFamily="18" charset="2"/>
+              <a:buChar char=""/>
+              <a:defRPr sz="1200" kern="1200">
+                <a:solidFill>
+                  <a:schemeClr val="tx2"/>
+                </a:solidFill>
+                <a:latin typeface="+mn-lt"/>
+                <a:ea typeface="+mn-ea"/>
+                <a:cs typeface="+mn-cs"/>
+              </a:defRPr>
+            </a:lvl7pPr>
+            <a:lvl8pPr marL="2500000" indent="-228600" algn="l" defTabSz="457200" rtl="0" eaLnBrk="1" latinLnBrk="0" hangingPunct="1">
+              <a:spcBef>
+                <a:spcPct val="20000"/>
+              </a:spcBef>
+              <a:spcAft>
+                <a:spcPts val="600"/>
+              </a:spcAft>
+              <a:buClr>
+                <a:schemeClr val="accent2"/>
+              </a:buClr>
+              <a:buSzPct val="92000"/>
+              <a:buFont typeface="Wingdings 2" panose="05020102010507070707" pitchFamily="18" charset="2"/>
+              <a:buChar char=""/>
+              <a:defRPr sz="1200" kern="1200">
+                <a:solidFill>
+                  <a:schemeClr val="tx2"/>
+                </a:solidFill>
+                <a:latin typeface="+mn-lt"/>
+                <a:ea typeface="+mn-ea"/>
+                <a:cs typeface="+mn-cs"/>
+              </a:defRPr>
+            </a:lvl8pPr>
+            <a:lvl9pPr marL="2800000" indent="-228600" algn="l" defTabSz="457200" rtl="0" eaLnBrk="1" latinLnBrk="0" hangingPunct="1">
+              <a:spcBef>
+                <a:spcPct val="20000"/>
+              </a:spcBef>
+              <a:spcAft>
+                <a:spcPts val="600"/>
+              </a:spcAft>
+              <a:buClr>
+                <a:schemeClr val="accent2"/>
+              </a:buClr>
+              <a:buSzPct val="92000"/>
+              <a:buFont typeface="Wingdings 2" panose="05020102010507070707" pitchFamily="18" charset="2"/>
+              <a:buChar char=""/>
+              <a:defRPr sz="1200" kern="1200">
+                <a:solidFill>
+                  <a:schemeClr val="tx2"/>
+                </a:solidFill>
+                <a:latin typeface="+mn-lt"/>
+                <a:ea typeface="+mn-ea"/>
+                <a:cs typeface="+mn-cs"/>
+              </a:defRPr>
+            </a:lvl9pPr>
+          </a:lstStyle>
+          <a:p>
+            <a:pPr marL="0" indent="0">
+              <a:buNone/>
+            </a:pPr>
+            <a:endParaRPr lang="en-GB" sz="1500" dirty="0"/>
+          </a:p>
+        </p:txBody>
+      </p:sp>
+      <p:pic>
+        <p:nvPicPr>
+          <p:cNvPr id="9" name="Picture 8" descr="A computer screen with text&#10;&#10;Description automatically generated">
+            <a:extLst>
+              <a:ext uri="{FF2B5EF4-FFF2-40B4-BE49-F238E27FC236}">
+                <a16:creationId xmlns:a16="http://schemas.microsoft.com/office/drawing/2014/main" id="{2D5AF0F3-0A47-1AFD-6044-34A2C441F516}"/>
+              </a:ext>
+            </a:extLst>
+          </p:cNvPr>
+          <p:cNvPicPr>
+            <a:picLocks noChangeAspect="1"/>
+          </p:cNvPicPr>
+          <p:nvPr/>
+        </p:nvPicPr>
+        <p:blipFill>
+          <a:blip r:embed="rId3"/>
+          <a:stretch>
+            <a:fillRect/>
+          </a:stretch>
+        </p:blipFill>
+        <p:spPr>
+          <a:xfrm>
+            <a:off x="5469903" y="2700421"/>
+            <a:ext cx="6048487" cy="2629777"/>
+          </a:xfrm>
+          <a:prstGeom prst="rect">
+            <a:avLst/>
+          </a:prstGeom>
+        </p:spPr>
+      </p:pic>
+    </p:spTree>
+    <p:extLst>
+      <p:ext uri="{BB962C8B-B14F-4D97-AF65-F5344CB8AC3E}">
+        <p14:creationId xmlns:p14="http://schemas.microsoft.com/office/powerpoint/2010/main" val="2626127338"/>
+      </p:ext>
+    </p:extLst>
+  </p:cSld>
+  <p:clrMapOvr>
+    <a:masterClrMapping/>
+  </p:clrMapOvr>
+</p:sld>
+</file>
+
+<file path=ppt/slides/slide6.xml><?xml version="1.0" encoding="utf-8"?>
 <p:sld xmlns:a="http://schemas.openxmlformats.org/drawingml/2006/main" xmlns:r="http://schemas.openxmlformats.org/officeDocument/2006/relationships" xmlns:p="http://schemas.openxmlformats.org/presentationml/2006/main">
   <p:cSld>
     <p:spTree>
@@ -6843,8 +6840,13 @@
           <a:p>
             <a:r>
               <a:rPr lang="en-GB" dirty="0"/>
-              <a:t>Types of HTTP Requests</a:t>
-            </a:r>
+              <a:t>App Layouts Using </a:t>
+            </a:r>
+            <a:r>
+              <a:rPr lang="en-GB" dirty="0" err="1"/>
+              <a:t>props.children</a:t>
+            </a:r>
+            <a:endParaRPr lang="en-GB" dirty="0"/>
           </a:p>
         </p:txBody>
       </p:sp>
@@ -6866,53 +6868,85 @@
         </p:nvSpPr>
         <p:spPr>
           <a:xfrm>
-            <a:off x="581193" y="2228003"/>
+            <a:off x="581193" y="2495295"/>
             <a:ext cx="5422390" cy="3633047"/>
           </a:xfrm>
         </p:spPr>
         <p:txBody>
           <a:bodyPr anchor="ctr">
-            <a:normAutofit/>
+            <a:normAutofit fontScale="92500" lnSpcReduction="10000"/>
           </a:bodyPr>
           <a:lstStyle/>
           <a:p>
             <a:r>
               <a:rPr lang="en-GB" b="1" dirty="0"/>
-              <a:t>GET</a:t>
-            </a:r>
+              <a:t>What is </a:t>
+            </a:r>
+            <a:r>
+              <a:rPr lang="en-GB" b="1" dirty="0" err="1"/>
+              <a:t>props.children</a:t>
+            </a:r>
+            <a:r>
+              <a:rPr lang="en-GB" b="1" dirty="0"/>
+              <a:t>?</a:t>
+            </a:r>
+            <a:br>
+              <a:rPr lang="en-GB" b="1" dirty="0"/>
+            </a:br>
             <a:r>
               <a:rPr lang="en-GB" dirty="0"/>
-              <a:t>: Retrieves data (read-only).</a:t>
+              <a:t>A special prop in React that allows components to render their children elements.</a:t>
             </a:r>
           </a:p>
           <a:p>
             <a:r>
               <a:rPr lang="en-GB" b="1" dirty="0"/>
-              <a:t>POST</a:t>
+              <a:t>Creating a Layout Component</a:t>
             </a:r>
             <a:r>
               <a:rPr lang="en-GB" dirty="0"/>
-              <a:t>: Sends new data to the server.</a:t>
-            </a:r>
-          </a:p>
-          <a:p>
+              <a:t>:</a:t>
+            </a:r>
+            <a:br>
+              <a:rPr lang="en-GB" dirty="0"/>
+            </a:br>
+            <a:r>
+              <a:rPr lang="en-GB" dirty="0"/>
+              <a:t>Define a reusable layout that wraps content passed as children.</a:t>
+            </a:r>
+          </a:p>
+          <a:p>
+            <a:pPr>
+              <a:buFont typeface="Arial" panose="020B0604020202020204" pitchFamily="34" charset="0"/>
+              <a:buChar char="•"/>
+            </a:pPr>
             <a:r>
               <a:rPr lang="en-GB" b="1" dirty="0"/>
-              <a:t>PUT</a:t>
+              <a:t>Use Cases</a:t>
             </a:r>
             <a:r>
               <a:rPr lang="en-GB" dirty="0"/>
-              <a:t>: Updates existing data.</a:t>
-            </a:r>
-          </a:p>
-          <a:p>
-            <a:r>
-              <a:rPr lang="en-GB" b="1" dirty="0"/>
-              <a:t>DELETE</a:t>
-            </a:r>
+              <a:t>:</a:t>
+            </a:r>
+          </a:p>
+          <a:p>
+            <a:pPr marL="742950" lvl="1" indent="-285750">
+              <a:buFont typeface="Arial" panose="020B0604020202020204" pitchFamily="34" charset="0"/>
+              <a:buChar char="•"/>
+            </a:pPr>
             <a:r>
               <a:rPr lang="en-GB" dirty="0"/>
-              <a:t>: Removes data.</a:t>
+              <a:t>Wrapping multiple pages with a consistent header/footer structure.</a:t>
+            </a:r>
+          </a:p>
+          <a:p>
+            <a:pPr marL="742950" lvl="1" indent="-285750">
+              <a:buFont typeface="Arial" panose="020B0604020202020204" pitchFamily="34" charset="0"/>
+              <a:buChar char="•"/>
+            </a:pPr>
+            <a:r>
+              <a:rPr lang="en-GB" dirty="0"/>
+              <a:t>Creating reusable components that serve as "wrappers" for various sections of the app.</a:t>
             </a:r>
             <a:br>
               <a:rPr lang="en-GB" dirty="0"/>
@@ -6921,32 +6955,8 @@
               <a:rPr lang="en-GB" dirty="0"/>
             </a:br>
             <a:r>
-              <a:rPr lang="en-GB" b="1" dirty="0"/>
-              <a:t>Example</a:t>
-            </a:r>
-            <a:r>
               <a:rPr lang="en-GB" dirty="0"/>
-              <a:t>:</a:t>
-            </a:r>
-          </a:p>
-          <a:p>
-            <a:pPr>
-              <a:buFont typeface="Arial" panose="020B0604020202020204" pitchFamily="34" charset="0"/>
-              <a:buChar char="•"/>
-            </a:pPr>
-            <a:r>
-              <a:rPr lang="en-GB" dirty="0"/>
-              <a:t>GET request to fetch weather data from an API.</a:t>
-            </a:r>
-          </a:p>
-          <a:p>
-            <a:pPr>
-              <a:buFont typeface="Arial" panose="020B0604020202020204" pitchFamily="34" charset="0"/>
-              <a:buChar char="•"/>
-            </a:pPr>
-            <a:r>
-              <a:rPr lang="en-GB" dirty="0"/>
-              <a:t>POST request to submit a form.</a:t>
+              <a:t>Demo…</a:t>
             </a:r>
           </a:p>
           <a:p>
@@ -6954,6 +6964,36 @@
           </a:p>
         </p:txBody>
       </p:sp>
+      <p:pic>
+        <p:nvPicPr>
+          <p:cNvPr id="5" name="Picture 4" descr="A screen shot of a computer code&#10;&#10;Description automatically generated">
+            <a:extLst>
+              <a:ext uri="{FF2B5EF4-FFF2-40B4-BE49-F238E27FC236}">
+                <a16:creationId xmlns:a16="http://schemas.microsoft.com/office/drawing/2014/main" id="{A68E739B-E53E-01F7-251B-2F461B317C84}"/>
+              </a:ext>
+            </a:extLst>
+          </p:cNvPr>
+          <p:cNvPicPr>
+            <a:picLocks noChangeAspect="1"/>
+          </p:cNvPicPr>
+          <p:nvPr/>
+        </p:nvPicPr>
+        <p:blipFill>
+          <a:blip r:embed="rId3"/>
+          <a:stretch>
+            <a:fillRect/>
+          </a:stretch>
+        </p:blipFill>
+        <p:spPr>
+          <a:xfrm>
+            <a:off x="7221416" y="1973861"/>
+            <a:ext cx="3083170" cy="4485584"/>
+          </a:xfrm>
+          <a:prstGeom prst="rect">
+            <a:avLst/>
+          </a:prstGeom>
+        </p:spPr>
+      </p:pic>
     </p:spTree>
     <p:extLst>
       <p:ext uri="{BB962C8B-B14F-4D97-AF65-F5344CB8AC3E}">
@@ -6967,7 +7007,7 @@
 </p:sld>
 </file>
 
-<file path=ppt/slides/slide6.xml><?xml version="1.0" encoding="utf-8"?>
+<file path=ppt/slides/slide7.xml><?xml version="1.0" encoding="utf-8"?>
 <p:sld xmlns:a="http://schemas.openxmlformats.org/drawingml/2006/main" xmlns:r="http://schemas.openxmlformats.org/officeDocument/2006/relationships" xmlns:p="http://schemas.openxmlformats.org/presentationml/2006/main">
   <p:cSld>
     <p:spTree>
@@ -7020,8 +7060,13 @@
           <a:p>
             <a:r>
               <a:rPr lang="en-GB" dirty="0"/>
-              <a:t>What is Postman?</a:t>
-            </a:r>
+              <a:t>Deployment Using </a:t>
+            </a:r>
+            <a:r>
+              <a:rPr lang="en-GB" dirty="0" err="1"/>
+              <a:t>Render.com</a:t>
+            </a:r>
+            <a:endParaRPr lang="en-GB" dirty="0"/>
           </a:p>
         </p:txBody>
       </p:sp>
@@ -7053,132 +7098,70 @@
           </a:bodyPr>
           <a:lstStyle/>
           <a:p>
+            <a:r>
+              <a:rPr lang="en-GB" b="1" dirty="0"/>
+              <a:t>Why </a:t>
+            </a:r>
+            <a:r>
+              <a:rPr lang="en-GB" b="1" dirty="0" err="1"/>
+              <a:t>render.com</a:t>
+            </a:r>
+            <a:r>
+              <a:rPr lang="en-GB" b="1" dirty="0"/>
+              <a:t>?</a:t>
+            </a:r>
+            <a:br>
+              <a:rPr lang="en-GB" b="1" dirty="0"/>
+            </a:br>
+            <a:r>
+              <a:rPr lang="en-GB" dirty="0" err="1"/>
+              <a:t>Render.com</a:t>
+            </a:r>
+            <a:r>
+              <a:rPr lang="en-GB" dirty="0"/>
+              <a:t> is a platform that simplifies deploying web applications, including React apps.</a:t>
+            </a:r>
+          </a:p>
+          <a:p>
             <a:pPr>
               <a:buFont typeface="Arial" panose="020B0604020202020204" pitchFamily="34" charset="0"/>
               <a:buChar char="•"/>
             </a:pPr>
             <a:r>
-              <a:rPr lang="en-GB" b="1" dirty="0"/>
-              <a:t>Postman</a:t>
-            </a:r>
-            <a:r>
               <a:rPr lang="en-GB" dirty="0"/>
-              <a:t> is a powerful tool for testing APIs and making HTTP requests.</a:t>
-            </a:r>
-          </a:p>
-          <a:p>
-            <a:pPr>
-              <a:buFont typeface="Arial" panose="020B0604020202020204" pitchFamily="34" charset="0"/>
-              <a:buChar char="•"/>
-            </a:pPr>
-            <a:r>
-              <a:rPr lang="en-GB" b="1" dirty="0"/>
-              <a:t>Key Features</a:t>
-            </a:r>
-            <a:r>
-              <a:rPr lang="en-GB" dirty="0"/>
-              <a:t>:</a:t>
-            </a:r>
-            <a:br>
-              <a:rPr lang="en-GB" dirty="0"/>
-            </a:br>
-            <a:br>
-              <a:rPr lang="en-GB" dirty="0"/>
-            </a:br>
-            <a:r>
-              <a:rPr lang="en-GB" dirty="0"/>
-              <a:t>Send different types of requests (GET, POST, PUT).</a:t>
-            </a:r>
-            <a:br>
-              <a:rPr lang="en-GB" dirty="0"/>
-            </a:br>
-            <a:br>
-              <a:rPr lang="en-GB" dirty="0"/>
-            </a:br>
-            <a:r>
-              <a:rPr lang="en-GB" dirty="0"/>
-              <a:t>Test and visualize responses.</a:t>
-            </a:r>
-            <a:br>
-              <a:rPr lang="en-GB" dirty="0"/>
-            </a:br>
-            <a:br>
-              <a:rPr lang="en-GB" dirty="0"/>
-            </a:br>
-            <a:r>
-              <a:rPr lang="en-GB" dirty="0"/>
-              <a:t>Set headers, parameters, and body data.</a:t>
-            </a:r>
-          </a:p>
-          <a:p>
-            <a:pPr>
-              <a:buFont typeface="Arial" panose="020B0604020202020204" pitchFamily="34" charset="0"/>
-              <a:buChar char="•"/>
-            </a:pPr>
-            <a:r>
-              <a:rPr lang="en-GB" b="1" dirty="0"/>
-              <a:t>Why use </a:t>
-            </a:r>
-            <a:r>
-              <a:rPr lang="en-GB" b="1" dirty="0" err="1"/>
-              <a:t>it?</a:t>
-            </a:r>
-            <a:r>
-              <a:rPr lang="en-GB" dirty="0" err="1"/>
-              <a:t>Makes</a:t>
-            </a:r>
-            <a:r>
-              <a:rPr lang="en-GB" dirty="0"/>
-              <a:t> working with APIs easier without writing code.</a:t>
+              <a:t>Provides automatic deployment, scaling, and HTTPS out of the box.</a:t>
             </a:r>
           </a:p>
         </p:txBody>
       </p:sp>
       <p:pic>
         <p:nvPicPr>
-          <p:cNvPr id="1026" name="Picture 2">
+          <p:cNvPr id="4" name="Picture 3">
             <a:extLst>
               <a:ext uri="{FF2B5EF4-FFF2-40B4-BE49-F238E27FC236}">
-                <a16:creationId xmlns:a16="http://schemas.microsoft.com/office/drawing/2014/main" id="{F6487D03-C702-934E-5AF9-83465B16A3FD}"/>
+                <a16:creationId xmlns:a16="http://schemas.microsoft.com/office/drawing/2014/main" id="{FA1705DF-04D9-AF44-DA39-C9E2D47DB3B0}"/>
               </a:ext>
             </a:extLst>
           </p:cNvPr>
           <p:cNvPicPr>
-            <a:picLocks noChangeAspect="1" noChangeArrowheads="1"/>
+            <a:picLocks noChangeAspect="1"/>
           </p:cNvPicPr>
           <p:nvPr/>
         </p:nvPicPr>
         <p:blipFill>
-          <a:blip r:embed="rId3">
-            <a:extLst>
-              <a:ext uri="{28A0092B-C50C-407E-A947-70E740481C1C}">
-                <a14:useLocalDpi xmlns:a14="http://schemas.microsoft.com/office/drawing/2010/main" val="0"/>
-              </a:ext>
-            </a:extLst>
-          </a:blip>
-          <a:srcRect/>
+          <a:blip r:embed="rId3"/>
           <a:stretch>
             <a:fillRect/>
           </a:stretch>
         </p:blipFill>
-        <p:spPr bwMode="auto">
-          <a:xfrm>
-            <a:off x="6670920" y="3096846"/>
-            <a:ext cx="4548066" cy="1380293"/>
+        <p:spPr>
+          <a:xfrm>
+            <a:off x="7237079" y="2920999"/>
+            <a:ext cx="3733800" cy="2171700"/>
           </a:xfrm>
           <a:prstGeom prst="rect">
             <a:avLst/>
           </a:prstGeom>
-          <a:noFill/>
-          <a:extLst>
-            <a:ext uri="{909E8E84-426E-40DD-AFC4-6F175D3DCCD1}">
-              <a14:hiddenFill xmlns:a14="http://schemas.microsoft.com/office/drawing/2010/main">
-                <a:solidFill>
-                  <a:srgbClr val="FFFFFF"/>
-                </a:solidFill>
-              </a14:hiddenFill>
-            </a:ext>
-          </a:extLst>
         </p:spPr>
       </p:pic>
     </p:spTree>
@@ -7194,7 +7177,7 @@
 </p:sld>
 </file>
 
-<file path=ppt/slides/slide7.xml><?xml version="1.0" encoding="utf-8"?>
+<file path=ppt/slides/slide8.xml><?xml version="1.0" encoding="utf-8"?>
 <p:sld xmlns:a="http://schemas.openxmlformats.org/drawingml/2006/main" xmlns:r="http://schemas.openxmlformats.org/officeDocument/2006/relationships" xmlns:p="http://schemas.openxmlformats.org/presentationml/2006/main">
   <p:cSld>
     <p:spTree>
@@ -7247,8 +7230,13 @@
           <a:p>
             <a:r>
               <a:rPr lang="en-GB" dirty="0"/>
-              <a:t>Using Postman for Basic HTTP Requests</a:t>
-            </a:r>
+              <a:t>Deployment Using </a:t>
+            </a:r>
+            <a:r>
+              <a:rPr lang="en-GB" dirty="0" err="1"/>
+              <a:t>Render.com</a:t>
+            </a:r>
+            <a:endParaRPr lang="en-GB" dirty="0"/>
           </a:p>
         </p:txBody>
       </p:sp>
@@ -7276,187 +7264,82 @@
         </p:spPr>
         <p:txBody>
           <a:bodyPr anchor="ctr">
-            <a:normAutofit/>
+            <a:normAutofit fontScale="85000" lnSpcReduction="10000"/>
           </a:bodyPr>
           <a:lstStyle/>
           <a:p>
-            <a:pPr>
-              <a:buFont typeface="Arial" panose="020B0604020202020204" pitchFamily="34" charset="0"/>
-              <a:buChar char="•"/>
-            </a:pPr>
             <a:r>
               <a:rPr lang="en-GB" b="1" dirty="0"/>
-              <a:t>Step 1</a:t>
+              <a:t>Steps to Deploy a React </a:t>
+            </a:r>
+            <a:r>
+              <a:rPr lang="en-GB" b="1" dirty="0" err="1"/>
+              <a:t>App</a:t>
+            </a:r>
+            <a:r>
+              <a:rPr lang="en-GB" dirty="0" err="1"/>
+              <a:t>:</a:t>
+            </a:r>
+            <a:r>
+              <a:rPr lang="en-GB" b="1" dirty="0" err="1"/>
+              <a:t>Step</a:t>
+            </a:r>
+            <a:r>
+              <a:rPr lang="en-GB" b="1" dirty="0"/>
+              <a:t> 1</a:t>
             </a:r>
             <a:r>
               <a:rPr lang="en-GB" dirty="0"/>
-              <a:t>: Install Postman from the official website.</a:t>
-            </a:r>
-          </a:p>
-          <a:p>
-            <a:pPr>
-              <a:buFont typeface="Arial" panose="020B0604020202020204" pitchFamily="34" charset="0"/>
-              <a:buChar char="•"/>
-            </a:pPr>
-            <a:r>
-              <a:rPr lang="en-GB" b="1" dirty="0"/>
-              <a:t>Step 2</a:t>
-            </a:r>
-            <a:r>
-              <a:rPr lang="en-GB" dirty="0"/>
-              <a:t>: Create a new request and set the method (GET, POST).</a:t>
-            </a:r>
-          </a:p>
-          <a:p>
-            <a:pPr>
-              <a:buFont typeface="Arial" panose="020B0604020202020204" pitchFamily="34" charset="0"/>
-              <a:buChar char="•"/>
-            </a:pPr>
-            <a:r>
-              <a:rPr lang="en-GB" b="1" dirty="0"/>
-              <a:t>Step 3</a:t>
-            </a:r>
-            <a:r>
-              <a:rPr lang="en-GB" dirty="0"/>
-              <a:t>: Enter the URL of the API endpoint.</a:t>
-            </a:r>
-          </a:p>
-          <a:p>
-            <a:pPr>
-              <a:buFont typeface="Arial" panose="020B0604020202020204" pitchFamily="34" charset="0"/>
-              <a:buChar char="•"/>
-            </a:pPr>
-            <a:r>
-              <a:rPr lang="en-GB" b="1" dirty="0"/>
-              <a:t>Step 4</a:t>
-            </a:r>
-            <a:r>
-              <a:rPr lang="en-GB" dirty="0"/>
-              <a:t>: Send the request and view the response (in JSON or other formats).</a:t>
+              <a:t>:</a:t>
             </a:r>
             <a:br>
               <a:rPr lang="en-GB" dirty="0"/>
             </a:br>
+            <a:r>
+              <a:rPr lang="en-GB" dirty="0"/>
+              <a:t> Set up your React app and push it to a Git repository (GitHub or GitLab).</a:t>
+            </a:r>
+          </a:p>
+          <a:p>
+            <a:r>
+              <a:rPr lang="en-GB" b="1" dirty="0"/>
+              <a:t>Step 2</a:t>
+            </a:r>
+            <a:r>
+              <a:rPr lang="en-GB" dirty="0"/>
+              <a:t>: </a:t>
+            </a:r>
             <a:br>
               <a:rPr lang="en-GB" dirty="0"/>
             </a:br>
             <a:r>
               <a:rPr lang="en-GB" dirty="0"/>
-              <a:t>demo…</a:t>
-            </a:r>
-          </a:p>
-        </p:txBody>
-      </p:sp>
-    </p:spTree>
-    <p:extLst>
-      <p:ext uri="{BB962C8B-B14F-4D97-AF65-F5344CB8AC3E}">
-        <p14:creationId xmlns:p14="http://schemas.microsoft.com/office/powerpoint/2010/main" val="2025468562"/>
-      </p:ext>
-    </p:extLst>
-  </p:cSld>
-  <p:clrMapOvr>
-    <a:masterClrMapping/>
-  </p:clrMapOvr>
-</p:sld>
-</file>
-
-<file path=ppt/slides/slide8.xml><?xml version="1.0" encoding="utf-8"?>
-<p:sld xmlns:a="http://schemas.openxmlformats.org/drawingml/2006/main" xmlns:r="http://schemas.openxmlformats.org/officeDocument/2006/relationships" xmlns:p="http://schemas.openxmlformats.org/presentationml/2006/main">
-  <p:cSld>
-    <p:spTree>
-      <p:nvGrpSpPr>
-        <p:cNvPr id="1" name="">
-          <a:extLst>
-            <a:ext uri="{FF2B5EF4-FFF2-40B4-BE49-F238E27FC236}">
-              <a16:creationId xmlns:a16="http://schemas.microsoft.com/office/drawing/2014/main" id="{8228EA1F-757A-0CAD-82A5-0D0564C6F3BE}"/>
-            </a:ext>
-          </a:extLst>
-        </p:cNvPr>
-        <p:cNvGrpSpPr/>
-        <p:nvPr/>
-      </p:nvGrpSpPr>
-      <p:grpSpPr>
-        <a:xfrm>
-          <a:off x="0" y="0"/>
-          <a:ext cx="0" cy="0"/>
-          <a:chOff x="0" y="0"/>
-          <a:chExt cx="0" cy="0"/>
-        </a:xfrm>
-      </p:grpSpPr>
-      <p:sp>
-        <p:nvSpPr>
-          <p:cNvPr id="2" name="Title 1">
-            <a:extLst>
-              <a:ext uri="{FF2B5EF4-FFF2-40B4-BE49-F238E27FC236}">
-                <a16:creationId xmlns:a16="http://schemas.microsoft.com/office/drawing/2014/main" id="{758C4B6C-C56E-4369-84BB-5EB567217E0E}"/>
-              </a:ext>
-            </a:extLst>
-          </p:cNvPr>
-          <p:cNvSpPr>
-            <a:spLocks noGrp="1"/>
-          </p:cNvSpPr>
-          <p:nvPr>
-            <p:ph type="title"/>
-          </p:nvPr>
-        </p:nvSpPr>
-        <p:spPr>
-          <a:xfrm>
-            <a:off x="581193" y="729658"/>
-            <a:ext cx="11029616" cy="988332"/>
-          </a:xfrm>
-        </p:spPr>
-        <p:txBody>
-          <a:bodyPr anchor="b">
-            <a:normAutofit/>
-          </a:bodyPr>
-          <a:lstStyle/>
-          <a:p>
+              <a:t>Sign up on </a:t>
+            </a:r>
+            <a:r>
+              <a:rPr lang="en-GB" dirty="0" err="1"/>
+              <a:t>Render.com</a:t>
+            </a:r>
             <a:r>
               <a:rPr lang="en-GB" dirty="0"/>
-              <a:t>What is JSON?</a:t>
-            </a:r>
-          </a:p>
-        </p:txBody>
-      </p:sp>
-      <p:sp>
-        <p:nvSpPr>
-          <p:cNvPr id="3" name="Content Placeholder 2">
-            <a:extLst>
-              <a:ext uri="{FF2B5EF4-FFF2-40B4-BE49-F238E27FC236}">
-                <a16:creationId xmlns:a16="http://schemas.microsoft.com/office/drawing/2014/main" id="{F917C5FA-63D8-72C9-6EB4-109F61F5F204}"/>
-              </a:ext>
-            </a:extLst>
-          </p:cNvPr>
-          <p:cNvSpPr>
-            <a:spLocks noGrp="1"/>
-          </p:cNvSpPr>
-          <p:nvPr>
-            <p:ph sz="half" idx="1"/>
-          </p:nvPr>
-        </p:nvSpPr>
-        <p:spPr>
-          <a:xfrm>
-            <a:off x="581193" y="2228003"/>
-            <a:ext cx="5422390" cy="3633047"/>
-          </a:xfrm>
-        </p:spPr>
-        <p:txBody>
-          <a:bodyPr anchor="ctr">
-            <a:normAutofit/>
-          </a:bodyPr>
-          <a:lstStyle/>
-          <a:p>
-            <a:pPr>
-              <a:buFont typeface="Arial" panose="020B0604020202020204" pitchFamily="34" charset="0"/>
-              <a:buChar char="•"/>
-            </a:pPr>
+              <a:t> and create a new web service.</a:t>
+            </a:r>
+          </a:p>
+          <a:p>
             <a:r>
               <a:rPr lang="en-GB" b="1" dirty="0"/>
-              <a:t>JavaScript Object Notation (JSON)</a:t>
+              <a:t>Step 3</a:t>
             </a:r>
             <a:r>
               <a:rPr lang="en-GB" dirty="0"/>
-              <a:t> is a lightweight format for data exchange.</a:t>
+              <a:t>: </a:t>
+            </a:r>
+            <a:br>
+              <a:rPr lang="en-GB" dirty="0"/>
+            </a:br>
+            <a:r>
+              <a:rPr lang="en-GB" dirty="0"/>
+              <a:t>Connect your repository and configure the build settings:</a:t>
             </a:r>
           </a:p>
           <a:p>
@@ -7465,8 +7348,28 @@
               <a:buChar char="•"/>
             </a:pPr>
             <a:r>
+              <a:rPr lang="en-GB" b="1" dirty="0"/>
+              <a:t>Build Command</a:t>
+            </a:r>
+            <a:r>
               <a:rPr lang="en-GB" dirty="0"/>
-              <a:t>Syntax: key-value pairs (like JavaScript objects).</a:t>
+              <a:t>: </a:t>
+            </a:r>
+            <a:r>
+              <a:rPr lang="en-GB" dirty="0" err="1"/>
+              <a:t>npm</a:t>
+            </a:r>
+            <a:r>
+              <a:rPr lang="en-GB" dirty="0"/>
+              <a:t> install &amp;&amp; </a:t>
+            </a:r>
+            <a:r>
+              <a:rPr lang="en-GB" dirty="0" err="1"/>
+              <a:t>npm</a:t>
+            </a:r>
+            <a:r>
+              <a:rPr lang="en-GB" dirty="0"/>
+              <a:t> run build</a:t>
             </a:r>
           </a:p>
           <a:p>
@@ -7475,8 +7378,29 @@
               <a:buChar char="•"/>
             </a:pPr>
             <a:r>
+              <a:rPr lang="en-GB" b="1" dirty="0"/>
+              <a:t>Start Command</a:t>
+            </a:r>
+            <a:r>
               <a:rPr lang="en-GB" dirty="0"/>
-              <a:t>Easy to read and write.</a:t>
+              <a:t>: serve -s build (assuming you’re using serve to serve the static files)</a:t>
+            </a:r>
+          </a:p>
+          <a:p>
+            <a:r>
+              <a:rPr lang="en-GB" b="1" dirty="0"/>
+              <a:t>Step 4</a:t>
+            </a:r>
+            <a:r>
+              <a:rPr lang="en-GB" dirty="0"/>
+              <a:t>: </a:t>
+            </a:r>
+            <a:br>
+              <a:rPr lang="en-GB" dirty="0"/>
+            </a:br>
+            <a:r>
+              <a:rPr lang="en-GB" dirty="0"/>
+              <a:t>Deploy and monitor the logs to confirm successful deployment.</a:t>
             </a:r>
           </a:p>
         </p:txBody>
@@ -7486,7 +7410,7 @@
           <p:cNvPr id="5" name="Picture 4" descr="A screenshot of a computer&#10;&#10;Description automatically generated">
             <a:extLst>
               <a:ext uri="{FF2B5EF4-FFF2-40B4-BE49-F238E27FC236}">
-                <a16:creationId xmlns:a16="http://schemas.microsoft.com/office/drawing/2014/main" id="{64810ECC-3868-FF81-8D46-E00A54DBDA1D}"/>
+                <a16:creationId xmlns:a16="http://schemas.microsoft.com/office/drawing/2014/main" id="{76FA26CB-074E-1D9C-DFF3-C278E4C3E137}"/>
               </a:ext>
             </a:extLst>
           </p:cNvPr>
@@ -7503,8 +7427,8 @@
         </p:blipFill>
         <p:spPr>
           <a:xfrm>
-            <a:off x="7341044" y="3413051"/>
-            <a:ext cx="2273300" cy="1384300"/>
+            <a:off x="6188419" y="2596055"/>
+            <a:ext cx="5257510" cy="2543956"/>
           </a:xfrm>
           <a:prstGeom prst="rect">
             <a:avLst/>
@@ -7514,7 +7438,7 @@
     </p:spTree>
     <p:extLst>
       <p:ext uri="{BB962C8B-B14F-4D97-AF65-F5344CB8AC3E}">
-        <p14:creationId xmlns:p14="http://schemas.microsoft.com/office/powerpoint/2010/main" val="1235399654"/>
+        <p14:creationId xmlns:p14="http://schemas.microsoft.com/office/powerpoint/2010/main" val="2025468562"/>
       </p:ext>
     </p:extLst>
   </p:cSld>
@@ -7532,7 +7456,7 @@
         <p:cNvPr id="1" name="">
           <a:extLst>
             <a:ext uri="{FF2B5EF4-FFF2-40B4-BE49-F238E27FC236}">
-              <a16:creationId xmlns:a16="http://schemas.microsoft.com/office/drawing/2014/main" id="{02B3D4AA-A31B-82F5-B997-94A4392F7CBC}"/>
+              <a16:creationId xmlns:a16="http://schemas.microsoft.com/office/drawing/2014/main" id="{CBAE109F-588F-7134-8695-E74285284B6E}"/>
             </a:ext>
           </a:extLst>
         </p:cNvPr>
@@ -7552,7 +7476,7 @@
           <p:cNvPr id="2" name="Title 1">
             <a:extLst>
               <a:ext uri="{FF2B5EF4-FFF2-40B4-BE49-F238E27FC236}">
-                <a16:creationId xmlns:a16="http://schemas.microsoft.com/office/drawing/2014/main" id="{CDA66507-E397-C799-0E31-DF06E62A0751}"/>
+                <a16:creationId xmlns:a16="http://schemas.microsoft.com/office/drawing/2014/main" id="{8AE22E85-AFCF-3262-0A2D-3CAB42E28851}"/>
               </a:ext>
             </a:extLst>
           </p:cNvPr>
@@ -7577,7 +7501,7 @@
           <a:p>
             <a:r>
               <a:rPr lang="en-GB" dirty="0"/>
-              <a:t>JSON Requests with the Fetch Method</a:t>
+              <a:t>Conclusion</a:t>
             </a:r>
           </a:p>
         </p:txBody>
@@ -7587,7 +7511,7 @@
           <p:cNvPr id="3" name="Content Placeholder 2">
             <a:extLst>
               <a:ext uri="{FF2B5EF4-FFF2-40B4-BE49-F238E27FC236}">
-                <a16:creationId xmlns:a16="http://schemas.microsoft.com/office/drawing/2014/main" id="{195F2A2C-0970-C0AC-03F0-057DD3EC67E8}"/>
+                <a16:creationId xmlns:a16="http://schemas.microsoft.com/office/drawing/2014/main" id="{93A23AC4-3B15-1984-83E6-4892CF66C3FF}"/>
               </a:ext>
             </a:extLst>
           </p:cNvPr>
@@ -7600,128 +7524,326 @@
         </p:nvSpPr>
         <p:spPr>
           <a:xfrm>
-            <a:off x="581193" y="2228003"/>
-            <a:ext cx="5422390" cy="3633047"/>
+            <a:off x="581192" y="2110773"/>
+            <a:ext cx="5198285" cy="3633047"/>
           </a:xfrm>
         </p:spPr>
         <p:txBody>
           <a:bodyPr anchor="ctr">
-            <a:normAutofit lnSpcReduction="10000"/>
+            <a:normAutofit/>
           </a:bodyPr>
           <a:lstStyle/>
           <a:p>
             <a:r>
               <a:rPr lang="en-GB" b="1" dirty="0"/>
-              <a:t>Fetch</a:t>
+              <a:t>Using </a:t>
+            </a:r>
+            <a:r>
+              <a:rPr lang="en-GB" b="1" dirty="0" err="1"/>
+              <a:t>APIs</a:t>
+            </a:r>
+            <a:r>
+              <a:rPr lang="en-GB" dirty="0" err="1"/>
+              <a:t>:Fetch</a:t>
             </a:r>
             <a:r>
               <a:rPr lang="en-GB" dirty="0"/>
-              <a:t>: A built-in JavaScript method for making HTTP requests.</a:t>
+              <a:t> and display data from third-party APIs with fetch and </a:t>
+            </a:r>
+            <a:r>
+              <a:rPr lang="en-GB" dirty="0" err="1"/>
+              <a:t>useEffect</a:t>
+            </a:r>
+            <a:r>
+              <a:rPr lang="en-GB" dirty="0"/>
+              <a:t>.</a:t>
             </a:r>
           </a:p>
           <a:p>
             <a:r>
               <a:rPr lang="en-GB" b="1" dirty="0"/>
-              <a:t>Basic Structure</a:t>
-            </a:r>
-            <a:br>
-              <a:rPr lang="en-GB" b="1" dirty="0"/>
-            </a:br>
-            <a:br>
-              <a:rPr lang="en-GB" b="1" dirty="0"/>
-            </a:br>
-            <a:br>
-              <a:rPr lang="en-GB" b="1" dirty="0"/>
-            </a:br>
-            <a:br>
-              <a:rPr lang="en-GB" b="1" dirty="0"/>
-            </a:br>
-            <a:br>
-              <a:rPr lang="en-GB" b="1" dirty="0"/>
-            </a:br>
-            <a:endParaRPr lang="en-GB" b="1" dirty="0"/>
-          </a:p>
-          <a:p>
-            <a:pPr>
-              <a:buFont typeface="Arial" panose="020B0604020202020204" pitchFamily="34" charset="0"/>
-              <a:buChar char="•"/>
-            </a:pPr>
-            <a:r>
-              <a:rPr lang="en-GB" b="1" dirty="0"/>
-              <a:t>How it works</a:t>
+              <a:t>Conditional </a:t>
+            </a:r>
+            <a:r>
+              <a:rPr lang="en-GB" b="1" dirty="0" err="1"/>
+              <a:t>Rendering</a:t>
+            </a:r>
+            <a:r>
+              <a:rPr lang="en-GB" dirty="0" err="1"/>
+              <a:t>:Techniques</a:t>
             </a:r>
             <a:r>
               <a:rPr lang="en-GB" dirty="0"/>
-              <a:t>:</a:t>
-            </a:r>
-          </a:p>
-          <a:p>
-            <a:pPr marL="742950" lvl="1" indent="-285750">
-              <a:buFont typeface="Arial" panose="020B0604020202020204" pitchFamily="34" charset="0"/>
-              <a:buChar char="•"/>
-            </a:pPr>
-            <a:r>
-              <a:rPr lang="en-GB" dirty="0"/>
-              <a:t>Fetch makes a request and receives a response.</a:t>
-            </a:r>
-          </a:p>
-          <a:p>
-            <a:pPr marL="742950" lvl="1" indent="-285750">
-              <a:buFont typeface="Arial" panose="020B0604020202020204" pitchFamily="34" charset="0"/>
-              <a:buChar char="•"/>
-            </a:pPr>
-            <a:r>
-              <a:rPr lang="en-GB" dirty="0"/>
-              <a:t>The .</a:t>
-            </a:r>
-            <a:r>
-              <a:rPr lang="en-GB" dirty="0" err="1"/>
-              <a:t>json</a:t>
-            </a:r>
-            <a:r>
-              <a:rPr lang="en-GB" dirty="0"/>
-              <a:t>() method parses the JSON data.</a:t>
-            </a:r>
-          </a:p>
-          <a:p>
-            <a:endParaRPr lang="en-GB" dirty="0"/>
-          </a:p>
-        </p:txBody>
-      </p:sp>
-      <p:pic>
-        <p:nvPicPr>
-          <p:cNvPr id="6" name="Picture 5" descr="A black background with white text&#10;&#10;Description automatically generated">
+              <a:t> to render components based on conditions, enhancing user experience.</a:t>
+            </a:r>
+          </a:p>
+        </p:txBody>
+      </p:sp>
+      <p:sp>
+        <p:nvSpPr>
+          <p:cNvPr id="4" name="Content Placeholder 2">
             <a:extLst>
               <a:ext uri="{FF2B5EF4-FFF2-40B4-BE49-F238E27FC236}">
-                <a16:creationId xmlns:a16="http://schemas.microsoft.com/office/drawing/2014/main" id="{C5D6F12F-D9AA-93EE-0557-26F5708F1D98}"/>
+                <a16:creationId xmlns:a16="http://schemas.microsoft.com/office/drawing/2014/main" id="{79A2AC00-B74D-0E8A-717E-A05DFFCD424F}"/>
               </a:ext>
             </a:extLst>
           </p:cNvPr>
-          <p:cNvPicPr>
-            <a:picLocks noChangeAspect="1"/>
-          </p:cNvPicPr>
+          <p:cNvSpPr txBox="1">
+            <a:spLocks/>
+          </p:cNvSpPr>
           <p:nvPr/>
-        </p:nvPicPr>
-        <p:blipFill>
-          <a:blip r:embed="rId2"/>
-          <a:stretch>
-            <a:fillRect/>
-          </a:stretch>
-        </p:blipFill>
-        <p:spPr>
-          <a:xfrm>
-            <a:off x="1316209" y="3269512"/>
-            <a:ext cx="4292600" cy="1041400"/>
+        </p:nvSpPr>
+        <p:spPr>
+          <a:xfrm>
+            <a:off x="6412523" y="2110773"/>
+            <a:ext cx="5198285" cy="3633047"/>
           </a:xfrm>
           <a:prstGeom prst="rect">
             <a:avLst/>
           </a:prstGeom>
         </p:spPr>
-      </p:pic>
+        <p:txBody>
+          <a:bodyPr vert="horz" lIns="91440" tIns="45720" rIns="91440" bIns="45720" rtlCol="0" anchor="ctr">
+            <a:normAutofit/>
+          </a:bodyPr>
+          <a:lstStyle>
+            <a:lvl1pPr marL="306000" indent="-306000" algn="l" defTabSz="457200" rtl="0" eaLnBrk="1" latinLnBrk="0" hangingPunct="1">
+              <a:spcBef>
+                <a:spcPct val="20000"/>
+              </a:spcBef>
+              <a:spcAft>
+                <a:spcPts val="600"/>
+              </a:spcAft>
+              <a:buClr>
+                <a:schemeClr val="accent2"/>
+              </a:buClr>
+              <a:buSzPct val="92000"/>
+              <a:buFont typeface="Wingdings 2" panose="05020102010507070707" pitchFamily="18" charset="2"/>
+              <a:buChar char=""/>
+              <a:defRPr sz="1800" kern="1200">
+                <a:solidFill>
+                  <a:schemeClr val="tx2"/>
+                </a:solidFill>
+                <a:latin typeface="+mn-lt"/>
+                <a:ea typeface="+mn-ea"/>
+                <a:cs typeface="+mn-cs"/>
+              </a:defRPr>
+            </a:lvl1pPr>
+            <a:lvl2pPr marL="630000" indent="-306000" algn="l" defTabSz="457200" rtl="0" eaLnBrk="1" latinLnBrk="0" hangingPunct="1">
+              <a:spcBef>
+                <a:spcPct val="20000"/>
+              </a:spcBef>
+              <a:spcAft>
+                <a:spcPts val="600"/>
+              </a:spcAft>
+              <a:buClr>
+                <a:schemeClr val="accent2"/>
+              </a:buClr>
+              <a:buSzPct val="92000"/>
+              <a:buFont typeface="Wingdings 2" panose="05020102010507070707" pitchFamily="18" charset="2"/>
+              <a:buChar char=""/>
+              <a:defRPr sz="1600" kern="1200">
+                <a:solidFill>
+                  <a:schemeClr val="tx2"/>
+                </a:solidFill>
+                <a:latin typeface="+mn-lt"/>
+                <a:ea typeface="+mn-ea"/>
+                <a:cs typeface="+mn-cs"/>
+              </a:defRPr>
+            </a:lvl2pPr>
+            <a:lvl3pPr marL="900000" indent="-270000" algn="l" defTabSz="457200" rtl="0" eaLnBrk="1" latinLnBrk="0" hangingPunct="1">
+              <a:spcBef>
+                <a:spcPct val="20000"/>
+              </a:spcBef>
+              <a:spcAft>
+                <a:spcPts val="600"/>
+              </a:spcAft>
+              <a:buClr>
+                <a:schemeClr val="accent2"/>
+              </a:buClr>
+              <a:buSzPct val="92000"/>
+              <a:buFont typeface="Wingdings 2" panose="05020102010507070707" pitchFamily="18" charset="2"/>
+              <a:buChar char=""/>
+              <a:defRPr sz="1400" kern="1200">
+                <a:solidFill>
+                  <a:schemeClr val="tx2"/>
+                </a:solidFill>
+                <a:latin typeface="+mn-lt"/>
+                <a:ea typeface="+mn-ea"/>
+                <a:cs typeface="+mn-cs"/>
+              </a:defRPr>
+            </a:lvl3pPr>
+            <a:lvl4pPr marL="1242000" indent="-234000" algn="l" defTabSz="457200" rtl="0" eaLnBrk="1" latinLnBrk="0" hangingPunct="1">
+              <a:spcBef>
+                <a:spcPct val="20000"/>
+              </a:spcBef>
+              <a:spcAft>
+                <a:spcPts val="600"/>
+              </a:spcAft>
+              <a:buClr>
+                <a:schemeClr val="accent2"/>
+              </a:buClr>
+              <a:buSzPct val="92000"/>
+              <a:buFont typeface="Wingdings 2" panose="05020102010507070707" pitchFamily="18" charset="2"/>
+              <a:buChar char=""/>
+              <a:defRPr sz="1200" kern="1200">
+                <a:solidFill>
+                  <a:schemeClr val="tx2"/>
+                </a:solidFill>
+                <a:latin typeface="+mn-lt"/>
+                <a:ea typeface="+mn-ea"/>
+                <a:cs typeface="+mn-cs"/>
+              </a:defRPr>
+            </a:lvl4pPr>
+            <a:lvl5pPr marL="1602000" indent="-234000" algn="l" defTabSz="457200" rtl="0" eaLnBrk="1" latinLnBrk="0" hangingPunct="1">
+              <a:spcBef>
+                <a:spcPct val="20000"/>
+              </a:spcBef>
+              <a:spcAft>
+                <a:spcPts val="600"/>
+              </a:spcAft>
+              <a:buClr>
+                <a:schemeClr val="accent2"/>
+              </a:buClr>
+              <a:buSzPct val="92000"/>
+              <a:buFont typeface="Wingdings 2" panose="05020102010507070707" pitchFamily="18" charset="2"/>
+              <a:buChar char=""/>
+              <a:defRPr sz="1200" kern="1200">
+                <a:solidFill>
+                  <a:schemeClr val="tx2"/>
+                </a:solidFill>
+                <a:latin typeface="+mn-lt"/>
+                <a:ea typeface="+mn-ea"/>
+                <a:cs typeface="+mn-cs"/>
+              </a:defRPr>
+            </a:lvl5pPr>
+            <a:lvl6pPr marL="1900000" indent="-228600" algn="l" defTabSz="457200" rtl="0" eaLnBrk="1" latinLnBrk="0" hangingPunct="1">
+              <a:spcBef>
+                <a:spcPct val="20000"/>
+              </a:spcBef>
+              <a:spcAft>
+                <a:spcPts val="600"/>
+              </a:spcAft>
+              <a:buClr>
+                <a:schemeClr val="accent2"/>
+              </a:buClr>
+              <a:buSzPct val="92000"/>
+              <a:buFont typeface="Wingdings 2" panose="05020102010507070707" pitchFamily="18" charset="2"/>
+              <a:buChar char=""/>
+              <a:defRPr sz="1200" kern="1200">
+                <a:solidFill>
+                  <a:schemeClr val="tx2"/>
+                </a:solidFill>
+                <a:latin typeface="+mn-lt"/>
+                <a:ea typeface="+mn-ea"/>
+                <a:cs typeface="+mn-cs"/>
+              </a:defRPr>
+            </a:lvl6pPr>
+            <a:lvl7pPr marL="2200000" indent="-228600" algn="l" defTabSz="457200" rtl="0" eaLnBrk="1" latinLnBrk="0" hangingPunct="1">
+              <a:spcBef>
+                <a:spcPct val="20000"/>
+              </a:spcBef>
+              <a:spcAft>
+                <a:spcPts val="600"/>
+              </a:spcAft>
+              <a:buClr>
+                <a:schemeClr val="accent2"/>
+              </a:buClr>
+              <a:buSzPct val="92000"/>
+              <a:buFont typeface="Wingdings 2" panose="05020102010507070707" pitchFamily="18" charset="2"/>
+              <a:buChar char=""/>
+              <a:defRPr sz="1200" kern="1200">
+                <a:solidFill>
+                  <a:schemeClr val="tx2"/>
+                </a:solidFill>
+                <a:latin typeface="+mn-lt"/>
+                <a:ea typeface="+mn-ea"/>
+                <a:cs typeface="+mn-cs"/>
+              </a:defRPr>
+            </a:lvl7pPr>
+            <a:lvl8pPr marL="2500000" indent="-228600" algn="l" defTabSz="457200" rtl="0" eaLnBrk="1" latinLnBrk="0" hangingPunct="1">
+              <a:spcBef>
+                <a:spcPct val="20000"/>
+              </a:spcBef>
+              <a:spcAft>
+                <a:spcPts val="600"/>
+              </a:spcAft>
+              <a:buClr>
+                <a:schemeClr val="accent2"/>
+              </a:buClr>
+              <a:buSzPct val="92000"/>
+              <a:buFont typeface="Wingdings 2" panose="05020102010507070707" pitchFamily="18" charset="2"/>
+              <a:buChar char=""/>
+              <a:defRPr sz="1200" kern="1200">
+                <a:solidFill>
+                  <a:schemeClr val="tx2"/>
+                </a:solidFill>
+                <a:latin typeface="+mn-lt"/>
+                <a:ea typeface="+mn-ea"/>
+                <a:cs typeface="+mn-cs"/>
+              </a:defRPr>
+            </a:lvl8pPr>
+            <a:lvl9pPr marL="2800000" indent="-228600" algn="l" defTabSz="457200" rtl="0" eaLnBrk="1" latinLnBrk="0" hangingPunct="1">
+              <a:spcBef>
+                <a:spcPct val="20000"/>
+              </a:spcBef>
+              <a:spcAft>
+                <a:spcPts val="600"/>
+              </a:spcAft>
+              <a:buClr>
+                <a:schemeClr val="accent2"/>
+              </a:buClr>
+              <a:buSzPct val="92000"/>
+              <a:buFont typeface="Wingdings 2" panose="05020102010507070707" pitchFamily="18" charset="2"/>
+              <a:buChar char=""/>
+              <a:defRPr sz="1200" kern="1200">
+                <a:solidFill>
+                  <a:schemeClr val="tx2"/>
+                </a:solidFill>
+                <a:latin typeface="+mn-lt"/>
+                <a:ea typeface="+mn-ea"/>
+                <a:cs typeface="+mn-cs"/>
+              </a:defRPr>
+            </a:lvl9pPr>
+          </a:lstStyle>
+          <a:p>
+            <a:r>
+              <a:rPr lang="en-GB" b="1" dirty="0"/>
+              <a:t>Layouts with </a:t>
+            </a:r>
+            <a:r>
+              <a:rPr lang="en-GB" b="1" dirty="0" err="1"/>
+              <a:t>props.children</a:t>
+            </a:r>
+            <a:r>
+              <a:rPr lang="en-GB" dirty="0" err="1"/>
+              <a:t>:Efficiently</a:t>
+            </a:r>
+            <a:r>
+              <a:rPr lang="en-GB" dirty="0"/>
+              <a:t> structure apps by passing child components into layout wrappers.</a:t>
+            </a:r>
+          </a:p>
+          <a:p>
+            <a:r>
+              <a:rPr lang="en-GB" b="1" dirty="0" err="1"/>
+              <a:t>Deployment</a:t>
+            </a:r>
+            <a:r>
+              <a:rPr lang="en-GB" dirty="0" err="1"/>
+              <a:t>:Render.com</a:t>
+            </a:r>
+            <a:r>
+              <a:rPr lang="en-GB" dirty="0"/>
+              <a:t> simplifies deploying and managing React apps in production.</a:t>
+            </a:r>
+          </a:p>
+        </p:txBody>
+      </p:sp>
     </p:spTree>
     <p:extLst>
       <p:ext uri="{BB962C8B-B14F-4D97-AF65-F5344CB8AC3E}">
-        <p14:creationId xmlns:p14="http://schemas.microsoft.com/office/powerpoint/2010/main" val="1082753359"/>
+        <p14:creationId xmlns:p14="http://schemas.microsoft.com/office/powerpoint/2010/main" val="4093454545"/>
       </p:ext>
     </p:extLst>
   </p:cSld>

</xml_diff>